<commit_message>
added "new" saga logo. some cleanup
git-svn-id: file://localhost/tmp/svn2git/svn@2397 defb5e50-622e-49ec-a68e-d72c7db87b45
</commit_message>
<xml_diff>
--- a/misc/SAGA Slide Template.pptx
+++ b/misc/SAGA Slide Template.pptx
@@ -4,10 +4,15 @@
   <p:sldMasterIdLst>
     <p:sldMasterId id="2147483660" r:id="rId1"/>
   </p:sldMasterIdLst>
+  <p:notesMasterIdLst>
+    <p:notesMasterId r:id="rId4"/>
+  </p:notesMasterIdLst>
+  <p:handoutMasterIdLst>
+    <p:handoutMasterId r:id="rId5"/>
+  </p:handoutMasterIdLst>
   <p:sldIdLst>
     <p:sldId id="256" r:id="rId2"/>
     <p:sldId id="257" r:id="rId3"/>
-    <p:sldId id="258" r:id="rId4"/>
   </p:sldIdLst>
   <p:sldSz cx="9144000" cy="6858000" type="screen4x3"/>
   <p:notesSz cx="6858000" cy="9144000"/>
@@ -109,8 +114,601 @@
 </p:presentation>
 </file>
 
+<file path=ppt/handoutMasters/handoutMaster1.xml><?xml version="1.0" encoding="utf-8"?>
+<p:handoutMaster xmlns:a="http://schemas.openxmlformats.org/drawingml/2006/main" xmlns:r="http://schemas.openxmlformats.org/officeDocument/2006/relationships" xmlns:mc="http://schemas.openxmlformats.org/markup-compatibility/2006" xmlns:mv="urn:schemas-microsoft-com:mac:vml" xmlns:p="http://schemas.openxmlformats.org/presentationml/2006/main" mc:Ignorable="mv" mc:PreserveAttributes="mv:*">
+  <p:cSld>
+    <p:bg>
+      <p:bgRef idx="1001">
+        <a:schemeClr val="bg1"/>
+      </p:bgRef>
+    </p:bg>
+    <p:spTree>
+      <p:nvGrpSpPr>
+        <p:cNvPr id="1" name=""/>
+        <p:cNvGrpSpPr/>
+        <p:nvPr/>
+      </p:nvGrpSpPr>
+      <p:grpSpPr>
+        <a:xfrm>
+          <a:off x="0" y="0"/>
+          <a:ext cx="0" cy="0"/>
+          <a:chOff x="0" y="0"/>
+          <a:chExt cx="0" cy="0"/>
+        </a:xfrm>
+      </p:grpSpPr>
+      <p:sp>
+        <p:nvSpPr>
+          <p:cNvPr id="2" name="Header Placeholder 1"/>
+          <p:cNvSpPr>
+            <a:spLocks noGrp="1"/>
+          </p:cNvSpPr>
+          <p:nvPr>
+            <p:ph type="hdr" sz="quarter"/>
+          </p:nvPr>
+        </p:nvSpPr>
+        <p:spPr>
+          <a:xfrm>
+            <a:off x="0" y="0"/>
+            <a:ext cx="2971800" cy="457200"/>
+          </a:xfrm>
+          <a:prstGeom prst="rect">
+            <a:avLst/>
+          </a:prstGeom>
+        </p:spPr>
+        <p:txBody>
+          <a:bodyPr vert="horz" lIns="91440" tIns="45720" rIns="91440" bIns="45720" rtlCol="0"/>
+          <a:lstStyle>
+            <a:lvl1pPr algn="l">
+              <a:defRPr sz="1200"/>
+            </a:lvl1pPr>
+          </a:lstStyle>
+          <a:p>
+            <a:endParaRPr lang="en-US"/>
+          </a:p>
+        </p:txBody>
+      </p:sp>
+      <p:sp>
+        <p:nvSpPr>
+          <p:cNvPr id="3" name="Date Placeholder 2"/>
+          <p:cNvSpPr>
+            <a:spLocks noGrp="1"/>
+          </p:cNvSpPr>
+          <p:nvPr>
+            <p:ph type="dt" sz="quarter" idx="1"/>
+          </p:nvPr>
+        </p:nvSpPr>
+        <p:spPr>
+          <a:xfrm>
+            <a:off x="3884613" y="0"/>
+            <a:ext cx="2971800" cy="457200"/>
+          </a:xfrm>
+          <a:prstGeom prst="rect">
+            <a:avLst/>
+          </a:prstGeom>
+        </p:spPr>
+        <p:txBody>
+          <a:bodyPr vert="horz" lIns="91440" tIns="45720" rIns="91440" bIns="45720" rtlCol="0"/>
+          <a:lstStyle>
+            <a:lvl1pPr algn="r">
+              <a:defRPr sz="1200"/>
+            </a:lvl1pPr>
+          </a:lstStyle>
+          <a:p>
+            <a:fld id="{9A6AC4B2-6F12-454D-8DA7-7B9C78843B81}" type="datetimeFigureOut">
+              <a:rPr lang="en-US" smtClean="0"/>
+              <a:t>2/9/10</a:t>
+            </a:fld>
+            <a:endParaRPr lang="en-US"/>
+          </a:p>
+        </p:txBody>
+      </p:sp>
+      <p:sp>
+        <p:nvSpPr>
+          <p:cNvPr id="4" name="Footer Placeholder 3"/>
+          <p:cNvSpPr>
+            <a:spLocks noGrp="1"/>
+          </p:cNvSpPr>
+          <p:nvPr>
+            <p:ph type="ftr" sz="quarter" idx="2"/>
+          </p:nvPr>
+        </p:nvSpPr>
+        <p:spPr>
+          <a:xfrm>
+            <a:off x="0" y="8685213"/>
+            <a:ext cx="2971800" cy="457200"/>
+          </a:xfrm>
+          <a:prstGeom prst="rect">
+            <a:avLst/>
+          </a:prstGeom>
+        </p:spPr>
+        <p:txBody>
+          <a:bodyPr vert="horz" lIns="91440" tIns="45720" rIns="91440" bIns="45720" rtlCol="0" anchor="b"/>
+          <a:lstStyle>
+            <a:lvl1pPr algn="l">
+              <a:defRPr sz="1200"/>
+            </a:lvl1pPr>
+          </a:lstStyle>
+          <a:p>
+            <a:endParaRPr lang="en-US"/>
+          </a:p>
+        </p:txBody>
+      </p:sp>
+      <p:sp>
+        <p:nvSpPr>
+          <p:cNvPr id="5" name="Slide Number Placeholder 4"/>
+          <p:cNvSpPr>
+            <a:spLocks noGrp="1"/>
+          </p:cNvSpPr>
+          <p:nvPr>
+            <p:ph type="sldNum" sz="quarter" idx="3"/>
+          </p:nvPr>
+        </p:nvSpPr>
+        <p:spPr>
+          <a:xfrm>
+            <a:off x="3884613" y="8685213"/>
+            <a:ext cx="2971800" cy="457200"/>
+          </a:xfrm>
+          <a:prstGeom prst="rect">
+            <a:avLst/>
+          </a:prstGeom>
+        </p:spPr>
+        <p:txBody>
+          <a:bodyPr vert="horz" lIns="91440" tIns="45720" rIns="91440" bIns="45720" rtlCol="0" anchor="b"/>
+          <a:lstStyle>
+            <a:lvl1pPr algn="r">
+              <a:defRPr sz="1200"/>
+            </a:lvl1pPr>
+          </a:lstStyle>
+          <a:p>
+            <a:fld id="{1FA2AEAE-9455-E64B-9026-F04C33961D84}" type="slidenum">
+              <a:rPr lang="en-US" smtClean="0"/>
+              <a:t>‹#›</a:t>
+            </a:fld>
+            <a:endParaRPr lang="en-US"/>
+          </a:p>
+        </p:txBody>
+      </p:sp>
+    </p:spTree>
+  </p:cSld>
+  <p:clrMap bg1="lt1" tx1="dk1" bg2="lt2" tx2="dk2" accent1="accent1" accent2="accent2" accent3="accent3" accent4="accent4" accent5="accent5" accent6="accent6" hlink="hlink" folHlink="folHlink"/>
+  <p:hf hdr="0" ftr="0" dt="0"/>
+</p:handoutMaster>
+</file>
+
+<file path=ppt/notesMasters/notesMaster1.xml><?xml version="1.0" encoding="utf-8"?>
+<p:notesMaster xmlns:a="http://schemas.openxmlformats.org/drawingml/2006/main" xmlns:r="http://schemas.openxmlformats.org/officeDocument/2006/relationships" xmlns:mc="http://schemas.openxmlformats.org/markup-compatibility/2006" xmlns:mv="urn:schemas-microsoft-com:mac:vml" xmlns:p="http://schemas.openxmlformats.org/presentationml/2006/main" mc:Ignorable="mv" mc:PreserveAttributes="mv:*">
+  <p:cSld>
+    <p:bg>
+      <p:bgRef idx="1001">
+        <a:schemeClr val="bg1"/>
+      </p:bgRef>
+    </p:bg>
+    <p:spTree>
+      <p:nvGrpSpPr>
+        <p:cNvPr id="1" name=""/>
+        <p:cNvGrpSpPr/>
+        <p:nvPr/>
+      </p:nvGrpSpPr>
+      <p:grpSpPr>
+        <a:xfrm>
+          <a:off x="0" y="0"/>
+          <a:ext cx="0" cy="0"/>
+          <a:chOff x="0" y="0"/>
+          <a:chExt cx="0" cy="0"/>
+        </a:xfrm>
+      </p:grpSpPr>
+      <p:sp>
+        <p:nvSpPr>
+          <p:cNvPr id="2" name="Header Placeholder 1"/>
+          <p:cNvSpPr>
+            <a:spLocks noGrp="1"/>
+          </p:cNvSpPr>
+          <p:nvPr>
+            <p:ph type="hdr" sz="quarter"/>
+          </p:nvPr>
+        </p:nvSpPr>
+        <p:spPr>
+          <a:xfrm>
+            <a:off x="0" y="0"/>
+            <a:ext cx="2971800" cy="457200"/>
+          </a:xfrm>
+          <a:prstGeom prst="rect">
+            <a:avLst/>
+          </a:prstGeom>
+        </p:spPr>
+        <p:txBody>
+          <a:bodyPr vert="horz" lIns="91440" tIns="45720" rIns="91440" bIns="45720" rtlCol="0"/>
+          <a:lstStyle>
+            <a:lvl1pPr algn="l">
+              <a:defRPr sz="1200"/>
+            </a:lvl1pPr>
+          </a:lstStyle>
+          <a:p>
+            <a:endParaRPr lang="en-US"/>
+          </a:p>
+        </p:txBody>
+      </p:sp>
+      <p:sp>
+        <p:nvSpPr>
+          <p:cNvPr id="3" name="Date Placeholder 2"/>
+          <p:cNvSpPr>
+            <a:spLocks noGrp="1"/>
+          </p:cNvSpPr>
+          <p:nvPr>
+            <p:ph type="dt" idx="1"/>
+          </p:nvPr>
+        </p:nvSpPr>
+        <p:spPr>
+          <a:xfrm>
+            <a:off x="3884613" y="0"/>
+            <a:ext cx="2971800" cy="457200"/>
+          </a:xfrm>
+          <a:prstGeom prst="rect">
+            <a:avLst/>
+          </a:prstGeom>
+        </p:spPr>
+        <p:txBody>
+          <a:bodyPr vert="horz" lIns="91440" tIns="45720" rIns="91440" bIns="45720" rtlCol="0"/>
+          <a:lstStyle>
+            <a:lvl1pPr algn="r">
+              <a:defRPr sz="1200"/>
+            </a:lvl1pPr>
+          </a:lstStyle>
+          <a:p>
+            <a:fld id="{19F24AD4-A78B-B645-8B43-825B1EB2901C}" type="datetimeFigureOut">
+              <a:rPr lang="en-US" smtClean="0"/>
+              <a:pPr/>
+              <a:t>2/9/10</a:t>
+            </a:fld>
+            <a:endParaRPr lang="en-US"/>
+          </a:p>
+        </p:txBody>
+      </p:sp>
+      <p:sp>
+        <p:nvSpPr>
+          <p:cNvPr id="4" name="Slide Image Placeholder 3"/>
+          <p:cNvSpPr>
+            <a:spLocks noGrp="1" noRot="1" noChangeAspect="1"/>
+          </p:cNvSpPr>
+          <p:nvPr>
+            <p:ph type="sldImg" idx="2"/>
+          </p:nvPr>
+        </p:nvSpPr>
+        <p:spPr>
+          <a:xfrm>
+            <a:off x="1143000" y="685800"/>
+            <a:ext cx="4572000" cy="3429000"/>
+          </a:xfrm>
+          <a:prstGeom prst="rect">
+            <a:avLst/>
+          </a:prstGeom>
+          <a:noFill/>
+          <a:ln w="12700">
+            <a:solidFill>
+              <a:prstClr val="black"/>
+            </a:solidFill>
+          </a:ln>
+        </p:spPr>
+        <p:txBody>
+          <a:bodyPr vert="horz" lIns="91440" tIns="45720" rIns="91440" bIns="45720" rtlCol="0" anchor="ctr"/>
+          <a:lstStyle/>
+          <a:p>
+            <a:endParaRPr lang="en-US"/>
+          </a:p>
+        </p:txBody>
+      </p:sp>
+      <p:sp>
+        <p:nvSpPr>
+          <p:cNvPr id="5" name="Notes Placeholder 4"/>
+          <p:cNvSpPr>
+            <a:spLocks noGrp="1"/>
+          </p:cNvSpPr>
+          <p:nvPr>
+            <p:ph type="body" sz="quarter" idx="3"/>
+          </p:nvPr>
+        </p:nvSpPr>
+        <p:spPr>
+          <a:xfrm>
+            <a:off x="685800" y="4343400"/>
+            <a:ext cx="5486400" cy="4114800"/>
+          </a:xfrm>
+          <a:prstGeom prst="rect">
+            <a:avLst/>
+          </a:prstGeom>
+        </p:spPr>
+        <p:txBody>
+          <a:bodyPr vert="horz" lIns="91440" tIns="45720" rIns="91440" bIns="45720" rtlCol="0">
+            <a:normAutofit/>
+          </a:bodyPr>
+          <a:lstStyle/>
+          <a:p>
+            <a:pPr lvl="0"/>
+            <a:r>
+              <a:rPr lang="en-US" smtClean="0"/>
+              <a:t>Click to edit Master text styles</a:t>
+            </a:r>
+          </a:p>
+          <a:p>
+            <a:pPr lvl="1"/>
+            <a:r>
+              <a:rPr lang="en-US" smtClean="0"/>
+              <a:t>Second level</a:t>
+            </a:r>
+          </a:p>
+          <a:p>
+            <a:pPr lvl="2"/>
+            <a:r>
+              <a:rPr lang="en-US" smtClean="0"/>
+              <a:t>Third level</a:t>
+            </a:r>
+          </a:p>
+          <a:p>
+            <a:pPr lvl="3"/>
+            <a:r>
+              <a:rPr lang="en-US" smtClean="0"/>
+              <a:t>Fourth level</a:t>
+            </a:r>
+          </a:p>
+          <a:p>
+            <a:pPr lvl="4"/>
+            <a:r>
+              <a:rPr lang="en-US" smtClean="0"/>
+              <a:t>Fifth level</a:t>
+            </a:r>
+            <a:endParaRPr lang="en-US"/>
+          </a:p>
+        </p:txBody>
+      </p:sp>
+      <p:sp>
+        <p:nvSpPr>
+          <p:cNvPr id="6" name="Footer Placeholder 5"/>
+          <p:cNvSpPr>
+            <a:spLocks noGrp="1"/>
+          </p:cNvSpPr>
+          <p:nvPr>
+            <p:ph type="ftr" sz="quarter" idx="4"/>
+          </p:nvPr>
+        </p:nvSpPr>
+        <p:spPr>
+          <a:xfrm>
+            <a:off x="0" y="8685213"/>
+            <a:ext cx="2971800" cy="457200"/>
+          </a:xfrm>
+          <a:prstGeom prst="rect">
+            <a:avLst/>
+          </a:prstGeom>
+        </p:spPr>
+        <p:txBody>
+          <a:bodyPr vert="horz" lIns="91440" tIns="45720" rIns="91440" bIns="45720" rtlCol="0" anchor="b"/>
+          <a:lstStyle>
+            <a:lvl1pPr algn="l">
+              <a:defRPr sz="1200"/>
+            </a:lvl1pPr>
+          </a:lstStyle>
+          <a:p>
+            <a:endParaRPr lang="en-US"/>
+          </a:p>
+        </p:txBody>
+      </p:sp>
+      <p:sp>
+        <p:nvSpPr>
+          <p:cNvPr id="7" name="Slide Number Placeholder 6"/>
+          <p:cNvSpPr>
+            <a:spLocks noGrp="1"/>
+          </p:cNvSpPr>
+          <p:nvPr>
+            <p:ph type="sldNum" sz="quarter" idx="5"/>
+          </p:nvPr>
+        </p:nvSpPr>
+        <p:spPr>
+          <a:xfrm>
+            <a:off x="3884613" y="8685213"/>
+            <a:ext cx="2971800" cy="457200"/>
+          </a:xfrm>
+          <a:prstGeom prst="rect">
+            <a:avLst/>
+          </a:prstGeom>
+        </p:spPr>
+        <p:txBody>
+          <a:bodyPr vert="horz" lIns="91440" tIns="45720" rIns="91440" bIns="45720" rtlCol="0" anchor="b"/>
+          <a:lstStyle>
+            <a:lvl1pPr algn="r">
+              <a:defRPr sz="1200"/>
+            </a:lvl1pPr>
+          </a:lstStyle>
+          <a:p>
+            <a:fld id="{EE41C05A-BBAC-0741-9B8E-1278839E95FE}" type="slidenum">
+              <a:rPr lang="en-US" smtClean="0"/>
+              <a:pPr/>
+              <a:t>‹#›</a:t>
+            </a:fld>
+            <a:endParaRPr lang="en-US"/>
+          </a:p>
+        </p:txBody>
+      </p:sp>
+    </p:spTree>
+  </p:cSld>
+  <p:clrMap bg1="lt1" tx1="dk1" bg2="lt2" tx2="dk2" accent1="accent1" accent2="accent2" accent3="accent3" accent4="accent4" accent5="accent5" accent6="accent6" hlink="hlink" folHlink="folHlink"/>
+  <p:hf hdr="0" ftr="0" dt="0"/>
+  <p:notesStyle>
+    <a:lvl1pPr marL="0" algn="l" defTabSz="457200" rtl="0" eaLnBrk="1" latinLnBrk="0" hangingPunct="1">
+      <a:defRPr sz="1200" kern="1200">
+        <a:solidFill>
+          <a:schemeClr val="tx1"/>
+        </a:solidFill>
+        <a:latin typeface="+mn-lt"/>
+        <a:ea typeface="+mn-ea"/>
+        <a:cs typeface="+mn-cs"/>
+      </a:defRPr>
+    </a:lvl1pPr>
+    <a:lvl2pPr marL="457200" algn="l" defTabSz="457200" rtl="0" eaLnBrk="1" latinLnBrk="0" hangingPunct="1">
+      <a:defRPr sz="1200" kern="1200">
+        <a:solidFill>
+          <a:schemeClr val="tx1"/>
+        </a:solidFill>
+        <a:latin typeface="+mn-lt"/>
+        <a:ea typeface="+mn-ea"/>
+        <a:cs typeface="+mn-cs"/>
+      </a:defRPr>
+    </a:lvl2pPr>
+    <a:lvl3pPr marL="914400" algn="l" defTabSz="457200" rtl="0" eaLnBrk="1" latinLnBrk="0" hangingPunct="1">
+      <a:defRPr sz="1200" kern="1200">
+        <a:solidFill>
+          <a:schemeClr val="tx1"/>
+        </a:solidFill>
+        <a:latin typeface="+mn-lt"/>
+        <a:ea typeface="+mn-ea"/>
+        <a:cs typeface="+mn-cs"/>
+      </a:defRPr>
+    </a:lvl3pPr>
+    <a:lvl4pPr marL="1371600" algn="l" defTabSz="457200" rtl="0" eaLnBrk="1" latinLnBrk="0" hangingPunct="1">
+      <a:defRPr sz="1200" kern="1200">
+        <a:solidFill>
+          <a:schemeClr val="tx1"/>
+        </a:solidFill>
+        <a:latin typeface="+mn-lt"/>
+        <a:ea typeface="+mn-ea"/>
+        <a:cs typeface="+mn-cs"/>
+      </a:defRPr>
+    </a:lvl4pPr>
+    <a:lvl5pPr marL="1828800" algn="l" defTabSz="457200" rtl="0" eaLnBrk="1" latinLnBrk="0" hangingPunct="1">
+      <a:defRPr sz="1200" kern="1200">
+        <a:solidFill>
+          <a:schemeClr val="tx1"/>
+        </a:solidFill>
+        <a:latin typeface="+mn-lt"/>
+        <a:ea typeface="+mn-ea"/>
+        <a:cs typeface="+mn-cs"/>
+      </a:defRPr>
+    </a:lvl5pPr>
+    <a:lvl6pPr marL="2286000" algn="l" defTabSz="457200" rtl="0" eaLnBrk="1" latinLnBrk="0" hangingPunct="1">
+      <a:defRPr sz="1200" kern="1200">
+        <a:solidFill>
+          <a:schemeClr val="tx1"/>
+        </a:solidFill>
+        <a:latin typeface="+mn-lt"/>
+        <a:ea typeface="+mn-ea"/>
+        <a:cs typeface="+mn-cs"/>
+      </a:defRPr>
+    </a:lvl6pPr>
+    <a:lvl7pPr marL="2743200" algn="l" defTabSz="457200" rtl="0" eaLnBrk="1" latinLnBrk="0" hangingPunct="1">
+      <a:defRPr sz="1200" kern="1200">
+        <a:solidFill>
+          <a:schemeClr val="tx1"/>
+        </a:solidFill>
+        <a:latin typeface="+mn-lt"/>
+        <a:ea typeface="+mn-ea"/>
+        <a:cs typeface="+mn-cs"/>
+      </a:defRPr>
+    </a:lvl7pPr>
+    <a:lvl8pPr marL="3200400" algn="l" defTabSz="457200" rtl="0" eaLnBrk="1" latinLnBrk="0" hangingPunct="1">
+      <a:defRPr sz="1200" kern="1200">
+        <a:solidFill>
+          <a:schemeClr val="tx1"/>
+        </a:solidFill>
+        <a:latin typeface="+mn-lt"/>
+        <a:ea typeface="+mn-ea"/>
+        <a:cs typeface="+mn-cs"/>
+      </a:defRPr>
+    </a:lvl8pPr>
+    <a:lvl9pPr marL="3657600" algn="l" defTabSz="457200" rtl="0" eaLnBrk="1" latinLnBrk="0" hangingPunct="1">
+      <a:defRPr sz="1200" kern="1200">
+        <a:solidFill>
+          <a:schemeClr val="tx1"/>
+        </a:solidFill>
+        <a:latin typeface="+mn-lt"/>
+        <a:ea typeface="+mn-ea"/>
+        <a:cs typeface="+mn-cs"/>
+      </a:defRPr>
+    </a:lvl9pPr>
+  </p:notesStyle>
+</p:notesMaster>
+</file>
+
+<file path=ppt/notesSlides/notesSlide1.xml><?xml version="1.0" encoding="utf-8"?>
+<p:notes xmlns:a="http://schemas.openxmlformats.org/drawingml/2006/main" xmlns:r="http://schemas.openxmlformats.org/officeDocument/2006/relationships" xmlns:mc="http://schemas.openxmlformats.org/markup-compatibility/2006" xmlns:mv="urn:schemas-microsoft-com:mac:vml" xmlns:p="http://schemas.openxmlformats.org/presentationml/2006/main" mc:Ignorable="mv" mc:PreserveAttributes="mv:*">
+  <p:cSld>
+    <p:spTree>
+      <p:nvGrpSpPr>
+        <p:cNvPr id="1" name=""/>
+        <p:cNvGrpSpPr/>
+        <p:nvPr/>
+      </p:nvGrpSpPr>
+      <p:grpSpPr>
+        <a:xfrm>
+          <a:off x="0" y="0"/>
+          <a:ext cx="0" cy="0"/>
+          <a:chOff x="0" y="0"/>
+          <a:chExt cx="0" cy="0"/>
+        </a:xfrm>
+      </p:grpSpPr>
+      <p:sp>
+        <p:nvSpPr>
+          <p:cNvPr id="2" name="Slide Image Placeholder 1"/>
+          <p:cNvSpPr>
+            <a:spLocks noGrp="1" noRot="1" noChangeAspect="1"/>
+          </p:cNvSpPr>
+          <p:nvPr>
+            <p:ph type="sldImg"/>
+          </p:nvPr>
+        </p:nvSpPr>
+        <p:spPr/>
+      </p:sp>
+      <p:sp>
+        <p:nvSpPr>
+          <p:cNvPr id="3" name="Notes Placeholder 2"/>
+          <p:cNvSpPr>
+            <a:spLocks noGrp="1"/>
+          </p:cNvSpPr>
+          <p:nvPr>
+            <p:ph type="body" idx="1"/>
+          </p:nvPr>
+        </p:nvSpPr>
+        <p:spPr/>
+        <p:txBody>
+          <a:bodyPr>
+            <a:normAutofit/>
+          </a:bodyPr>
+          <a:lstStyle/>
+          <a:p>
+            <a:endParaRPr lang="en-US" dirty="0"/>
+          </a:p>
+        </p:txBody>
+      </p:sp>
+      <p:sp>
+        <p:nvSpPr>
+          <p:cNvPr id="4" name="Slide Number Placeholder 3"/>
+          <p:cNvSpPr>
+            <a:spLocks noGrp="1"/>
+          </p:cNvSpPr>
+          <p:nvPr>
+            <p:ph type="sldNum" sz="quarter" idx="10"/>
+          </p:nvPr>
+        </p:nvSpPr>
+        <p:spPr/>
+        <p:txBody>
+          <a:bodyPr/>
+          <a:lstStyle/>
+          <a:p>
+            <a:fld id="{EE41C05A-BBAC-0741-9B8E-1278839E95FE}" type="slidenum">
+              <a:rPr lang="en-US" smtClean="0"/>
+              <a:pPr/>
+              <a:t>1</a:t>
+            </a:fld>
+            <a:endParaRPr lang="en-US"/>
+          </a:p>
+        </p:txBody>
+      </p:sp>
+    </p:spTree>
+  </p:cSld>
+  <p:clrMapOvr>
+    <a:masterClrMapping/>
+  </p:clrMapOvr>
+</p:notes>
+</file>
+
 <file path=ppt/slideLayouts/slideLayout1.xml><?xml version="1.0" encoding="utf-8"?>
-<p:sldLayout xmlns:a="http://schemas.openxmlformats.org/drawingml/2006/main" xmlns:r="http://schemas.openxmlformats.org/officeDocument/2006/relationships" xmlns:mc="http://schemas.openxmlformats.org/markup-compatibility/2006" xmlns:mv="urn:schemas-microsoft-com:mac:vml" xmlns:p="http://schemas.openxmlformats.org/presentationml/2006/main" mc:Ignorable="mv" mc:PreserveAttributes="mv:*" type="title" preserve="1">
+<p:sldLayout xmlns:a="http://schemas.openxmlformats.org/drawingml/2006/main" xmlns:r="http://schemas.openxmlformats.org/officeDocument/2006/relationships" xmlns:mc="http://schemas.openxmlformats.org/markup-compatibility/2006" xmlns:mv="urn:schemas-microsoft-com:mac:vml" xmlns:p="http://schemas.openxmlformats.org/presentationml/2006/main" mc:Ignorable="mv" mc:PreserveAttributes="mv:*" preserve="1" userDrawn="1">
   <p:cSld name="Title Slide">
     <p:spTree>
       <p:nvGrpSpPr>
@@ -126,264 +724,6 @@
           <a:chExt cx="0" cy="0"/>
         </a:xfrm>
       </p:grpSpPr>
-      <p:sp>
-        <p:nvSpPr>
-          <p:cNvPr id="3" name="Subtitle 2"/>
-          <p:cNvSpPr>
-            <a:spLocks noGrp="1"/>
-          </p:cNvSpPr>
-          <p:nvPr>
-            <p:ph type="subTitle" idx="1"/>
-          </p:nvPr>
-        </p:nvSpPr>
-        <p:spPr>
-          <a:xfrm>
-            <a:off x="914400" y="3034553"/>
-            <a:ext cx="8001000" cy="3823447"/>
-          </a:xfrm>
-          <a:solidFill>
-            <a:schemeClr val="bg2">
-              <a:lumMod val="40000"/>
-              <a:lumOff val="60000"/>
-            </a:schemeClr>
-          </a:solidFill>
-          <a:ln>
-            <a:noFill/>
-          </a:ln>
-        </p:spPr>
-        <p:style>
-          <a:lnRef idx="2">
-            <a:schemeClr val="accent1">
-              <a:shade val="50000"/>
-            </a:schemeClr>
-          </a:lnRef>
-          <a:fillRef idx="1">
-            <a:schemeClr val="accent1"/>
-          </a:fillRef>
-          <a:effectRef idx="0">
-            <a:schemeClr val="accent1"/>
-          </a:effectRef>
-          <a:fontRef idx="minor">
-            <a:schemeClr val="lt1"/>
-          </a:fontRef>
-        </p:style>
-        <p:txBody>
-          <a:bodyPr vert="horz" lIns="292608" tIns="91440" rIns="274320" bIns="91440" rtlCol="0" anchor="t" anchorCtr="0">
-            <a:normAutofit/>
-          </a:bodyPr>
-          <a:lstStyle>
-            <a:lvl1pPr marL="0" indent="0" algn="l" defTabSz="914400" rtl="0" eaLnBrk="1" latinLnBrk="0" hangingPunct="1">
-              <a:spcBef>
-                <a:spcPts val="2000"/>
-              </a:spcBef>
-              <a:buClr>
-                <a:schemeClr val="accent1"/>
-              </a:buClr>
-              <a:buFont typeface="Wingdings 2" pitchFamily="18" charset="2"/>
-              <a:buNone/>
-              <a:defRPr sz="2000" kern="1200">
-                <a:solidFill>
-                  <a:schemeClr val="tx1">
-                    <a:lumMod val="65000"/>
-                    <a:lumOff val="35000"/>
-                  </a:schemeClr>
-                </a:solidFill>
-                <a:latin typeface="+mn-lt"/>
-                <a:ea typeface="+mn-ea"/>
-                <a:cs typeface="+mn-cs"/>
-              </a:defRPr>
-            </a:lvl1pPr>
-            <a:lvl2pPr marL="457200" indent="0" algn="ctr">
-              <a:buNone/>
-              <a:defRPr>
-                <a:solidFill>
-                  <a:schemeClr val="tx1">
-                    <a:tint val="75000"/>
-                  </a:schemeClr>
-                </a:solidFill>
-              </a:defRPr>
-            </a:lvl2pPr>
-            <a:lvl3pPr marL="914400" indent="0" algn="ctr">
-              <a:buNone/>
-              <a:defRPr>
-                <a:solidFill>
-                  <a:schemeClr val="tx1">
-                    <a:tint val="75000"/>
-                  </a:schemeClr>
-                </a:solidFill>
-              </a:defRPr>
-            </a:lvl3pPr>
-            <a:lvl4pPr marL="1371600" indent="0" algn="ctr">
-              <a:buNone/>
-              <a:defRPr>
-                <a:solidFill>
-                  <a:schemeClr val="tx1">
-                    <a:tint val="75000"/>
-                  </a:schemeClr>
-                </a:solidFill>
-              </a:defRPr>
-            </a:lvl4pPr>
-            <a:lvl5pPr marL="1828800" indent="0" algn="ctr">
-              <a:buNone/>
-              <a:defRPr>
-                <a:solidFill>
-                  <a:schemeClr val="tx1">
-                    <a:tint val="75000"/>
-                  </a:schemeClr>
-                </a:solidFill>
-              </a:defRPr>
-            </a:lvl5pPr>
-            <a:lvl6pPr marL="2286000" indent="0" algn="ctr">
-              <a:buNone/>
-              <a:defRPr>
-                <a:solidFill>
-                  <a:schemeClr val="tx1">
-                    <a:tint val="75000"/>
-                  </a:schemeClr>
-                </a:solidFill>
-              </a:defRPr>
-            </a:lvl6pPr>
-            <a:lvl7pPr marL="2743200" indent="0" algn="ctr">
-              <a:buNone/>
-              <a:defRPr>
-                <a:solidFill>
-                  <a:schemeClr val="tx1">
-                    <a:tint val="75000"/>
-                  </a:schemeClr>
-                </a:solidFill>
-              </a:defRPr>
-            </a:lvl7pPr>
-            <a:lvl8pPr marL="3200400" indent="0" algn="ctr">
-              <a:buNone/>
-              <a:defRPr>
-                <a:solidFill>
-                  <a:schemeClr val="tx1">
-                    <a:tint val="75000"/>
-                  </a:schemeClr>
-                </a:solidFill>
-              </a:defRPr>
-            </a:lvl8pPr>
-            <a:lvl9pPr marL="3657600" indent="0" algn="ctr">
-              <a:buNone/>
-              <a:defRPr>
-                <a:solidFill>
-                  <a:schemeClr val="tx1">
-                    <a:tint val="75000"/>
-                  </a:schemeClr>
-                </a:solidFill>
-              </a:defRPr>
-            </a:lvl9pPr>
-          </a:lstStyle>
-          <a:p>
-            <a:r>
-              <a:rPr lang="en-US" dirty="0" smtClean="0"/>
-              <a:t>Click to edit Master subtitle style</a:t>
-            </a:r>
-            <a:endParaRPr dirty="0"/>
-          </a:p>
-        </p:txBody>
-      </p:sp>
-      <p:sp>
-        <p:nvSpPr>
-          <p:cNvPr id="2" name="Title 1"/>
-          <p:cNvSpPr>
-            <a:spLocks noGrp="1"/>
-          </p:cNvSpPr>
-          <p:nvPr>
-            <p:ph type="ctrTitle"/>
-          </p:nvPr>
-        </p:nvSpPr>
-        <p:spPr>
-          <a:xfrm>
-            <a:off x="0" y="2157319"/>
-            <a:ext cx="8915400" cy="877824"/>
-          </a:xfrm>
-        </p:spPr>
-        <p:txBody>
-          <a:bodyPr>
-            <a:normAutofit/>
-          </a:bodyPr>
-          <a:lstStyle>
-            <a:lvl1pPr>
-              <a:defRPr sz="3800"/>
-            </a:lvl1pPr>
-          </a:lstStyle>
-          <a:p>
-            <a:r>
-              <a:rPr lang="en-US" dirty="0" smtClean="0"/>
-              <a:t>Click to edit Master title style</a:t>
-            </a:r>
-            <a:endParaRPr dirty="0"/>
-          </a:p>
-        </p:txBody>
-      </p:sp>
-      <p:sp>
-        <p:nvSpPr>
-          <p:cNvPr id="4" name="Date Placeholder 3"/>
-          <p:cNvSpPr>
-            <a:spLocks noGrp="1"/>
-          </p:cNvSpPr>
-          <p:nvPr>
-            <p:ph type="dt" sz="half" idx="10"/>
-          </p:nvPr>
-        </p:nvSpPr>
-        <p:spPr/>
-        <p:txBody>
-          <a:bodyPr/>
-          <a:lstStyle/>
-          <a:p>
-            <a:fld id="{4C4AD4EB-88D0-C141-9474-CCD86A78CB94}" type="datetimeFigureOut">
-              <a:rPr lang="en-US" smtClean="0"/>
-              <a:pPr/>
-              <a:t>11/1/09</a:t>
-            </a:fld>
-            <a:endParaRPr lang="en-US" dirty="0"/>
-          </a:p>
-        </p:txBody>
-      </p:sp>
-      <p:sp>
-        <p:nvSpPr>
-          <p:cNvPr id="5" name="Footer Placeholder 4"/>
-          <p:cNvSpPr>
-            <a:spLocks noGrp="1"/>
-          </p:cNvSpPr>
-          <p:nvPr>
-            <p:ph type="ftr" sz="quarter" idx="11"/>
-          </p:nvPr>
-        </p:nvSpPr>
-        <p:spPr/>
-        <p:txBody>
-          <a:bodyPr/>
-          <a:lstStyle/>
-          <a:p>
-            <a:endParaRPr lang="en-US" dirty="0"/>
-          </a:p>
-        </p:txBody>
-      </p:sp>
-      <p:sp>
-        <p:nvSpPr>
-          <p:cNvPr id="6" name="Slide Number Placeholder 5"/>
-          <p:cNvSpPr>
-            <a:spLocks noGrp="1"/>
-          </p:cNvSpPr>
-          <p:nvPr>
-            <p:ph type="sldNum" sz="quarter" idx="12"/>
-          </p:nvPr>
-        </p:nvSpPr>
-        <p:spPr/>
-        <p:txBody>
-          <a:bodyPr/>
-          <a:lstStyle/>
-          <a:p>
-            <a:fld id="{DF7665AF-92BA-E649-941D-268879B3EA81}" type="slidenum">
-              <a:rPr lang="en-US" smtClean="0"/>
-              <a:pPr/>
-              <a:t>‹#›</a:t>
-            </a:fld>
-            <a:endParaRPr lang="en-US"/>
-          </a:p>
-        </p:txBody>
-      </p:sp>
       <p:pic>
         <p:nvPicPr>
           <p:cNvPr id="11" name="Picture 1"/>
@@ -401,8 +741,8 @@
         </p:blipFill>
         <p:spPr bwMode="auto">
           <a:xfrm>
-            <a:off x="7252295" y="558269"/>
-            <a:ext cx="1644429" cy="1483674"/>
+            <a:off x="7130616" y="570391"/>
+            <a:ext cx="1644429" cy="1289027"/>
           </a:xfrm>
           <a:prstGeom prst="rect">
             <a:avLst/>
@@ -416,6 +756,173 @@
           </a:ln>
         </p:spPr>
       </p:pic>
+      <p:sp>
+        <p:nvSpPr>
+          <p:cNvPr id="8" name="Rectangle 7"/>
+          <p:cNvSpPr/>
+          <p:nvPr userDrawn="1"/>
+        </p:nvSpPr>
+        <p:spPr>
+          <a:xfrm>
+            <a:off x="0" y="2157319"/>
+            <a:ext cx="8923005" cy="877234"/>
+          </a:xfrm>
+          <a:prstGeom prst="rect">
+            <a:avLst/>
+          </a:prstGeom>
+          <a:solidFill>
+            <a:srgbClr val="424242"/>
+          </a:solidFill>
+          <a:ln>
+            <a:noFill/>
+          </a:ln>
+          <a:effectLst/>
+          <a:scene3d>
+            <a:camera prst="obliqueTopRight"/>
+            <a:lightRig rig="threePt" dir="tl"/>
+          </a:scene3d>
+          <a:sp3d/>
+        </p:spPr>
+        <p:style>
+          <a:lnRef idx="1">
+            <a:schemeClr val="accent1"/>
+          </a:lnRef>
+          <a:fillRef idx="3">
+            <a:schemeClr val="accent1"/>
+          </a:fillRef>
+          <a:effectRef idx="2">
+            <a:schemeClr val="accent1"/>
+          </a:effectRef>
+          <a:fontRef idx="minor">
+            <a:schemeClr val="lt1"/>
+          </a:fontRef>
+        </p:style>
+        <p:txBody>
+          <a:bodyPr rtlCol="0" anchor="ctr"/>
+          <a:lstStyle/>
+          <a:p>
+            <a:pPr algn="ctr"/>
+            <a:endParaRPr lang="en-US"/>
+          </a:p>
+        </p:txBody>
+      </p:sp>
+      <p:pic>
+        <p:nvPicPr>
+          <p:cNvPr id="9" name="Picture 8" descr="SAGA Helvetica Logo.png"/>
+          <p:cNvPicPr>
+            <a:picLocks noChangeAspect="1"/>
+          </p:cNvPicPr>
+          <p:nvPr userDrawn="1"/>
+        </p:nvPicPr>
+        <p:blipFill>
+          <a:blip r:embed="rId3"/>
+          <a:stretch>
+            <a:fillRect/>
+          </a:stretch>
+        </p:blipFill>
+        <p:spPr>
+          <a:xfrm>
+            <a:off x="1226205" y="2251145"/>
+            <a:ext cx="2892308" cy="707358"/>
+          </a:xfrm>
+          <a:prstGeom prst="rect">
+            <a:avLst/>
+          </a:prstGeom>
+        </p:spPr>
+      </p:pic>
+      <p:sp>
+        <p:nvSpPr>
+          <p:cNvPr id="14" name="Title 13"/>
+          <p:cNvSpPr>
+            <a:spLocks noGrp="1"/>
+          </p:cNvSpPr>
+          <p:nvPr>
+            <p:ph type="title"/>
+          </p:nvPr>
+        </p:nvSpPr>
+        <p:spPr>
+          <a:xfrm>
+            <a:off x="914400" y="3043020"/>
+            <a:ext cx="8001000" cy="3814980"/>
+          </a:xfrm>
+          <a:solidFill>
+            <a:srgbClr val="E4E6DE"/>
+          </a:solidFill>
+        </p:spPr>
+        <p:txBody>
+          <a:bodyPr lIns="274320" tIns="91440" bIns="91440" anchor="t" anchorCtr="0">
+            <a:noAutofit/>
+          </a:bodyPr>
+          <a:lstStyle>
+            <a:lvl1pPr>
+              <a:defRPr sz="2000">
+                <a:solidFill>
+                  <a:srgbClr val="595959"/>
+                </a:solidFill>
+              </a:defRPr>
+            </a:lvl1pPr>
+          </a:lstStyle>
+          <a:p>
+            <a:r>
+              <a:rPr lang="en-US" dirty="0" smtClean="0"/>
+              <a:t>Click to edit Master title style</a:t>
+            </a:r>
+            <a:endParaRPr lang="en-US" dirty="0"/>
+          </a:p>
+        </p:txBody>
+      </p:sp>
+      <p:sp>
+        <p:nvSpPr>
+          <p:cNvPr id="6" name="Date Placeholder 5"/>
+          <p:cNvSpPr>
+            <a:spLocks noGrp="1"/>
+          </p:cNvSpPr>
+          <p:nvPr>
+            <p:ph type="dt" sz="half" idx="10"/>
+          </p:nvPr>
+        </p:nvSpPr>
+        <p:spPr>
+          <a:xfrm>
+            <a:off x="6580094" y="6492875"/>
+            <a:ext cx="2133600" cy="365125"/>
+          </a:xfrm>
+        </p:spPr>
+        <p:txBody>
+          <a:bodyPr/>
+          <a:lstStyle/>
+          <a:p>
+            <a:fld id="{ADB8239A-D789-5443-937F-338E3AE3D41C}" type="datetime1">
+              <a:rPr lang="en-US" smtClean="0"/>
+              <a:t>2/9/10</a:t>
+            </a:fld>
+            <a:endParaRPr lang="en-US"/>
+          </a:p>
+        </p:txBody>
+      </p:sp>
+      <p:sp>
+        <p:nvSpPr>
+          <p:cNvPr id="10" name="Footer Placeholder 9"/>
+          <p:cNvSpPr>
+            <a:spLocks noGrp="1"/>
+          </p:cNvSpPr>
+          <p:nvPr>
+            <p:ph type="ftr" sz="quarter" idx="12"/>
+          </p:nvPr>
+        </p:nvSpPr>
+        <p:spPr>
+          <a:xfrm>
+            <a:off x="1120588" y="6492875"/>
+            <a:ext cx="2895600" cy="365125"/>
+          </a:xfrm>
+        </p:spPr>
+        <p:txBody>
+          <a:bodyPr/>
+          <a:lstStyle/>
+          <a:p>
+            <a:endParaRPr lang="en-US" dirty="0"/>
+          </a:p>
+        </p:txBody>
+      </p:sp>
     </p:spTree>
   </p:cSld>
   <p:clrMapOvr>
@@ -687,10 +1194,9 @@
           <a:bodyPr/>
           <a:lstStyle/>
           <a:p>
-            <a:fld id="{4C4AD4EB-88D0-C141-9474-CCD86A78CB94}" type="datetimeFigureOut">
-              <a:rPr lang="en-US" smtClean="0"/>
-              <a:pPr/>
-              <a:t>11/1/09</a:t>
+            <a:fld id="{459EC1CE-E98D-704D-AD6F-6E3323A36483}" type="datetime1">
+              <a:rPr lang="en-US" smtClean="0"/>
+              <a:t>2/9/10</a:t>
             </a:fld>
             <a:endParaRPr lang="en-US"/>
           </a:p>
@@ -963,10 +1469,9 @@
           <a:bodyPr/>
           <a:lstStyle/>
           <a:p>
-            <a:fld id="{4C4AD4EB-88D0-C141-9474-CCD86A78CB94}" type="datetimeFigureOut">
-              <a:rPr lang="en-US" smtClean="0"/>
-              <a:pPr/>
-              <a:t>11/1/09</a:t>
+            <a:fld id="{23E692A5-8B3E-1949-B0CC-6F0593ACFA8E}" type="datetime1">
+              <a:rPr lang="en-US" smtClean="0"/>
+              <a:t>2/9/10</a:t>
             </a:fld>
             <a:endParaRPr lang="en-US"/>
           </a:p>
@@ -1255,10 +1760,9 @@
           <a:bodyPr/>
           <a:lstStyle/>
           <a:p>
-            <a:fld id="{4C4AD4EB-88D0-C141-9474-CCD86A78CB94}" type="datetimeFigureOut">
-              <a:rPr lang="en-US" smtClean="0"/>
-              <a:pPr/>
-              <a:t>11/1/09</a:t>
+            <a:fld id="{C381DA14-A3C0-9C42-96F2-BEE3D5DE963D}" type="datetime1">
+              <a:rPr lang="en-US" smtClean="0"/>
+              <a:t>2/9/10</a:t>
             </a:fld>
             <a:endParaRPr lang="en-US"/>
           </a:p>
@@ -1582,10 +2086,9 @@
           <a:bodyPr/>
           <a:lstStyle/>
           <a:p>
-            <a:fld id="{4C4AD4EB-88D0-C141-9474-CCD86A78CB94}" type="datetimeFigureOut">
-              <a:rPr lang="en-US" smtClean="0"/>
-              <a:pPr/>
-              <a:t>11/1/09</a:t>
+            <a:fld id="{33319320-9A5F-694B-B7B5-C734EC93AAA2}" type="datetime1">
+              <a:rPr lang="en-US" smtClean="0"/>
+              <a:t>2/9/10</a:t>
             </a:fld>
             <a:endParaRPr lang="en-US"/>
           </a:p>
@@ -1830,10 +2333,9 @@
           <a:bodyPr/>
           <a:lstStyle/>
           <a:p>
-            <a:fld id="{4C4AD4EB-88D0-C141-9474-CCD86A78CB94}" type="datetimeFigureOut">
-              <a:rPr lang="en-US" smtClean="0"/>
-              <a:pPr/>
-              <a:t>11/1/09</a:t>
+            <a:fld id="{CF6CE397-A6E6-7547-B24A-92BB5049E0F2}" type="datetime1">
+              <a:rPr lang="en-US" smtClean="0"/>
+              <a:t>2/9/10</a:t>
             </a:fld>
             <a:endParaRPr lang="en-US"/>
           </a:p>
@@ -2007,10 +2509,9 @@
           <a:bodyPr/>
           <a:lstStyle/>
           <a:p>
-            <a:fld id="{4C4AD4EB-88D0-C141-9474-CCD86A78CB94}" type="datetimeFigureOut">
-              <a:rPr lang="en-US" smtClean="0"/>
-              <a:pPr/>
-              <a:t>11/1/09</a:t>
+            <a:fld id="{27AB7D46-BD5E-E641-9118-DCE28F3B83FA}" type="datetime1">
+              <a:rPr lang="en-US" smtClean="0"/>
+              <a:t>2/9/10</a:t>
             </a:fld>
             <a:endParaRPr lang="en-US"/>
           </a:p>
@@ -2094,16 +2595,36 @@
             <p:ph type="title"/>
           </p:nvPr>
         </p:nvSpPr>
-        <p:spPr/>
-        <p:txBody>
-          <a:bodyPr/>
-          <a:lstStyle/>
-          <a:p>
-            <a:r>
-              <a:rPr lang="en-US" smtClean="0"/>
+        <p:spPr>
+          <a:xfrm>
+            <a:off x="0" y="1024990"/>
+            <a:ext cx="8913813" cy="792651"/>
+          </a:xfrm>
+          <a:solidFill>
+            <a:srgbClr val="424242"/>
+          </a:solidFill>
+        </p:spPr>
+        <p:txBody>
+          <a:bodyPr lIns="1097280" anchor="ctr" anchorCtr="0">
+            <a:normAutofit/>
+          </a:bodyPr>
+          <a:lstStyle>
+            <a:lvl1pPr>
+              <a:defRPr sz="2800">
+                <a:solidFill>
+                  <a:schemeClr val="bg1">
+                    <a:lumMod val="75000"/>
+                  </a:schemeClr>
+                </a:solidFill>
+              </a:defRPr>
+            </a:lvl1pPr>
+          </a:lstStyle>
+          <a:p>
+            <a:r>
+              <a:rPr lang="en-US" dirty="0" smtClean="0"/>
               <a:t>Click to edit Master title style</a:t>
             </a:r>
-            <a:endParaRPr/>
+            <a:endParaRPr dirty="0"/>
           </a:p>
         </p:txBody>
       </p:sp>
@@ -2119,8 +2640,8 @@
         </p:nvSpPr>
         <p:spPr>
           <a:xfrm>
-            <a:off x="757947" y="2427248"/>
-            <a:ext cx="7966954" cy="3839081"/>
+            <a:off x="757947" y="2068618"/>
+            <a:ext cx="7966954" cy="4197711"/>
           </a:xfrm>
         </p:spPr>
         <p:txBody>
@@ -2128,31 +2649,31 @@
           <a:lstStyle>
             <a:lvl1pPr>
               <a:buClr>
-                <a:srgbClr val="E9A400"/>
+                <a:srgbClr val="8BACBD"/>
               </a:buClr>
               <a:defRPr/>
             </a:lvl1pPr>
             <a:lvl2pPr>
               <a:buClr>
-                <a:srgbClr val="424242"/>
+                <a:srgbClr val="B5B5B5"/>
               </a:buClr>
               <a:defRPr/>
             </a:lvl2pPr>
             <a:lvl3pPr>
               <a:buClr>
-                <a:srgbClr val="E9A400"/>
+                <a:srgbClr val="8BACBD"/>
               </a:buClr>
               <a:defRPr/>
             </a:lvl3pPr>
             <a:lvl4pPr>
               <a:buClr>
-                <a:srgbClr val="424242"/>
+                <a:srgbClr val="B5B5B5"/>
               </a:buClr>
               <a:defRPr/>
             </a:lvl4pPr>
             <a:lvl5pPr>
               <a:buClr>
-                <a:srgbClr val="E9A400"/>
+                <a:srgbClr val="8BACBD"/>
               </a:buClr>
               <a:defRPr/>
             </a:lvl5pPr>
@@ -2195,105 +2716,106 @@
           </a:p>
         </p:txBody>
       </p:sp>
-      <p:sp>
-        <p:nvSpPr>
-          <p:cNvPr id="4" name="Date Placeholder 3"/>
-          <p:cNvSpPr>
-            <a:spLocks noGrp="1"/>
-          </p:cNvSpPr>
-          <p:nvPr>
-            <p:ph type="dt" sz="half" idx="10"/>
-          </p:nvPr>
-        </p:nvSpPr>
-        <p:spPr/>
-        <p:txBody>
-          <a:bodyPr/>
-          <a:lstStyle/>
-          <a:p>
-            <a:fld id="{4C4AD4EB-88D0-C141-9474-CCD86A78CB94}" type="datetimeFigureOut">
-              <a:rPr lang="en-US" smtClean="0"/>
-              <a:pPr/>
-              <a:t>11/1/09</a:t>
-            </a:fld>
-            <a:endParaRPr lang="en-US"/>
-          </a:p>
-        </p:txBody>
-      </p:sp>
-      <p:sp>
-        <p:nvSpPr>
-          <p:cNvPr id="5" name="Footer Placeholder 4"/>
-          <p:cNvSpPr>
-            <a:spLocks noGrp="1"/>
-          </p:cNvSpPr>
-          <p:nvPr>
-            <p:ph type="ftr" sz="quarter" idx="11"/>
-          </p:nvPr>
-        </p:nvSpPr>
-        <p:spPr/>
-        <p:txBody>
-          <a:bodyPr/>
-          <a:lstStyle/>
-          <a:p>
-            <a:endParaRPr lang="en-US"/>
-          </a:p>
-        </p:txBody>
-      </p:sp>
-      <p:sp>
-        <p:nvSpPr>
-          <p:cNvPr id="6" name="Slide Number Placeholder 5"/>
-          <p:cNvSpPr>
-            <a:spLocks noGrp="1"/>
-          </p:cNvSpPr>
-          <p:nvPr>
-            <p:ph type="sldNum" sz="quarter" idx="12"/>
-          </p:nvPr>
-        </p:nvSpPr>
-        <p:spPr/>
-        <p:txBody>
-          <a:bodyPr/>
-          <a:lstStyle/>
-          <a:p>
-            <a:fld id="{DF7665AF-92BA-E649-941D-268879B3EA81}" type="slidenum">
-              <a:rPr lang="en-US" smtClean="0"/>
-              <a:pPr/>
-              <a:t>‹#›</a:t>
-            </a:fld>
-            <a:endParaRPr lang="en-US"/>
-          </a:p>
-        </p:txBody>
-      </p:sp>
       <p:pic>
         <p:nvPicPr>
-          <p:cNvPr id="7" name="Picture 1"/>
+          <p:cNvPr id="8" name="Picture 7" descr="SAGA Helvetica Logo.png"/>
           <p:cNvPicPr>
-            <a:picLocks noChangeArrowheads="1"/>
+            <a:picLocks noChangeAspect="1"/>
           </p:cNvPicPr>
           <p:nvPr userDrawn="1"/>
         </p:nvPicPr>
         <p:blipFill>
           <a:blip r:embed="rId2"/>
-          <a:srcRect/>
           <a:stretch>
             <a:fillRect/>
           </a:stretch>
         </p:blipFill>
-        <p:spPr bwMode="auto">
-          <a:xfrm>
-            <a:off x="94958" y="263714"/>
-            <a:ext cx="786525" cy="709637"/>
+        <p:spPr>
+          <a:xfrm>
+            <a:off x="904298" y="334440"/>
+            <a:ext cx="2282176" cy="558141"/>
           </a:xfrm>
           <a:prstGeom prst="rect">
             <a:avLst/>
           </a:prstGeom>
-          <a:noFill/>
-          <a:ln w="12700">
-            <a:noFill/>
-            <a:miter lim="800000"/>
-            <a:headEnd/>
-            <a:tailEnd/>
-          </a:ln>
         </p:spPr>
       </p:pic>
+      <p:sp>
+        <p:nvSpPr>
+          <p:cNvPr id="9" name="Date Placeholder 8"/>
+          <p:cNvSpPr>
+            <a:spLocks noGrp="1"/>
+          </p:cNvSpPr>
+          <p:nvPr>
+            <p:ph type="dt" sz="half" idx="10"/>
+          </p:nvPr>
+        </p:nvSpPr>
+        <p:spPr>
+          <a:xfrm>
+            <a:off x="6580094" y="6492875"/>
+            <a:ext cx="2133600" cy="365125"/>
+          </a:xfrm>
+        </p:spPr>
+        <p:txBody>
+          <a:bodyPr/>
+          <a:lstStyle/>
+          <a:p>
+            <a:fld id="{BC26097E-015C-3B4D-86C1-CD2AD30F0B81}" type="datetime1">
+              <a:rPr lang="en-US" smtClean="0"/>
+              <a:t>2/9/10</a:t>
+            </a:fld>
+            <a:endParaRPr lang="en-US"/>
+          </a:p>
+        </p:txBody>
+      </p:sp>
+      <p:sp>
+        <p:nvSpPr>
+          <p:cNvPr id="10" name="Slide Number Placeholder 9"/>
+          <p:cNvSpPr>
+            <a:spLocks noGrp="1"/>
+          </p:cNvSpPr>
+          <p:nvPr>
+            <p:ph type="sldNum" sz="quarter" idx="11"/>
+          </p:nvPr>
+        </p:nvSpPr>
+        <p:spPr/>
+        <p:txBody>
+          <a:bodyPr/>
+          <a:lstStyle/>
+          <a:p>
+            <a:fld id="{DF7665AF-92BA-E649-941D-268879B3EA81}" type="slidenum">
+              <a:rPr lang="en-US" smtClean="0"/>
+              <a:pPr/>
+              <a:t>‹#›</a:t>
+            </a:fld>
+            <a:endParaRPr lang="en-US"/>
+          </a:p>
+        </p:txBody>
+      </p:sp>
+      <p:sp>
+        <p:nvSpPr>
+          <p:cNvPr id="11" name="Footer Placeholder 10"/>
+          <p:cNvSpPr>
+            <a:spLocks noGrp="1"/>
+          </p:cNvSpPr>
+          <p:nvPr>
+            <p:ph type="ftr" sz="quarter" idx="12"/>
+          </p:nvPr>
+        </p:nvSpPr>
+        <p:spPr>
+          <a:xfrm>
+            <a:off x="1120588" y="6492875"/>
+            <a:ext cx="2895600" cy="365125"/>
+          </a:xfrm>
+        </p:spPr>
+        <p:txBody>
+          <a:bodyPr/>
+          <a:lstStyle/>
+          <a:p>
+            <a:endParaRPr lang="en-US" dirty="0"/>
+          </a:p>
+        </p:txBody>
+      </p:sp>
     </p:spTree>
   </p:cSld>
   <p:clrMapOvr>
@@ -2513,10 +3035,9 @@
           <a:bodyPr/>
           <a:lstStyle/>
           <a:p>
-            <a:fld id="{4C4AD4EB-88D0-C141-9474-CCD86A78CB94}" type="datetimeFigureOut">
-              <a:rPr lang="en-US" smtClean="0"/>
-              <a:pPr/>
-              <a:t>11/1/09</a:t>
+            <a:fld id="{ED6649F4-2545-3040-B7BD-803CA59D50C7}" type="datetime1">
+              <a:rPr lang="en-US" smtClean="0"/>
+              <a:t>2/9/10</a:t>
             </a:fld>
             <a:endParaRPr lang="en-US"/>
           </a:p>
@@ -2821,10 +3342,9 @@
           <a:bodyPr/>
           <a:lstStyle/>
           <a:p>
-            <a:fld id="{4C4AD4EB-88D0-C141-9474-CCD86A78CB94}" type="datetimeFigureOut">
-              <a:rPr lang="en-US" smtClean="0"/>
-              <a:pPr/>
-              <a:t>11/1/09</a:t>
+            <a:fld id="{833A9088-CEDD-2F48-A9A0-611A3CC03FE9}" type="datetime1">
+              <a:rPr lang="en-US" smtClean="0"/>
+              <a:t>2/9/10</a:t>
             </a:fld>
             <a:endParaRPr lang="en-US"/>
           </a:p>
@@ -3115,10 +3635,9 @@
           <a:bodyPr/>
           <a:lstStyle/>
           <a:p>
-            <a:fld id="{4C4AD4EB-88D0-C141-9474-CCD86A78CB94}" type="datetimeFigureOut">
-              <a:rPr lang="en-US" smtClean="0"/>
-              <a:pPr/>
-              <a:t>11/1/09</a:t>
+            <a:fld id="{AED87ACF-EB3C-EA42-8610-542FB50388EB}" type="datetime1">
+              <a:rPr lang="en-US" smtClean="0"/>
+              <a:t>2/9/10</a:t>
             </a:fld>
             <a:endParaRPr lang="en-US"/>
           </a:p>
@@ -3547,10 +4066,9 @@
           <a:bodyPr/>
           <a:lstStyle/>
           <a:p>
-            <a:fld id="{4C4AD4EB-88D0-C141-9474-CCD86A78CB94}" type="datetimeFigureOut">
-              <a:rPr lang="en-US" smtClean="0"/>
-              <a:pPr/>
-              <a:t>11/1/09</a:t>
+            <a:fld id="{0E0DC31B-692F-774E-A937-DA560DE61DA8}" type="datetime1">
+              <a:rPr lang="en-US" smtClean="0"/>
+              <a:t>2/9/10</a:t>
             </a:fld>
             <a:endParaRPr lang="en-US"/>
           </a:p>
@@ -3895,10 +4413,9 @@
           <a:bodyPr/>
           <a:lstStyle/>
           <a:p>
-            <a:fld id="{4C4AD4EB-88D0-C141-9474-CCD86A78CB94}" type="datetimeFigureOut">
-              <a:rPr lang="en-US" smtClean="0"/>
-              <a:pPr/>
-              <a:t>11/1/09</a:t>
+            <a:fld id="{95DEFDAE-5BDC-1B4F-BC4C-23C867CEBC21}" type="datetime1">
+              <a:rPr lang="en-US" smtClean="0"/>
+              <a:t>2/9/10</a:t>
             </a:fld>
             <a:endParaRPr lang="en-US"/>
           </a:p>
@@ -3987,10 +4504,9 @@
           <a:bodyPr/>
           <a:lstStyle/>
           <a:p>
-            <a:fld id="{4C4AD4EB-88D0-C141-9474-CCD86A78CB94}" type="datetimeFigureOut">
-              <a:rPr lang="en-US" smtClean="0"/>
-              <a:pPr/>
-              <a:t>11/1/09</a:t>
+            <a:fld id="{9F53C516-787B-9A45-AFCF-5D75DD78DEBE}" type="datetime1">
+              <a:rPr lang="en-US" smtClean="0"/>
+              <a:t>2/9/10</a:t>
             </a:fld>
             <a:endParaRPr lang="en-US"/>
           </a:p>
@@ -4326,10 +4842,9 @@
           <a:bodyPr/>
           <a:lstStyle/>
           <a:p>
-            <a:fld id="{4C4AD4EB-88D0-C141-9474-CCD86A78CB94}" type="datetimeFigureOut">
-              <a:rPr lang="en-US" smtClean="0"/>
-              <a:pPr/>
-              <a:t>11/1/09</a:t>
+            <a:fld id="{F19CAA94-9393-BB4A-8CB6-008B1351A132}" type="datetime1">
+              <a:rPr lang="en-US" smtClean="0"/>
+              <a:t>2/9/10</a:t>
             </a:fld>
             <a:endParaRPr lang="en-US"/>
           </a:p>
@@ -4437,10 +4952,10 @@
           <a:lstStyle/>
           <a:p>
             <a:r>
-              <a:rPr lang="en-US" smtClean="0"/>
+              <a:rPr lang="en-US" dirty="0" smtClean="0"/>
               <a:t>Click to edit Master title style</a:t>
             </a:r>
-            <a:endParaRPr/>
+            <a:endParaRPr dirty="0"/>
           </a:p>
         </p:txBody>
       </p:sp>
@@ -4540,10 +5055,9 @@
             </a:lvl1pPr>
           </a:lstStyle>
           <a:p>
-            <a:fld id="{4C4AD4EB-88D0-C141-9474-CCD86A78CB94}" type="datetimeFigureOut">
-              <a:rPr lang="en-US" smtClean="0"/>
-              <a:pPr/>
-              <a:t>11/1/09</a:t>
+            <a:fld id="{A3476A5E-2ED6-7749-A8C1-D0B1EEEB97E0}" type="datetime1">
+              <a:rPr lang="en-US" smtClean="0"/>
+              <a:t>2/9/10</a:t>
             </a:fld>
             <a:endParaRPr lang="en-US"/>
           </a:p>
@@ -4583,7 +5097,7 @@
             </a:lvl1pPr>
           </a:lstStyle>
           <a:p>
-            <a:endParaRPr lang="en-US"/>
+            <a:endParaRPr lang="en-US" dirty="0"/>
           </a:p>
         </p:txBody>
       </p:sp>
@@ -4748,6 +5262,7 @@
     <p:sldLayoutId id="2147483674" r:id="rId14"/>
     <p:sldLayoutId id="2147483675" r:id="rId15"/>
   </p:sldLayoutIdLst>
+  <p:hf sldNum="0" hdr="0" ftr="0" dt="0"/>
   <p:txStyles>
     <p:titleStyle>
       <a:lvl1pPr marL="0" indent="0" algn="l" defTabSz="914400" rtl="0" eaLnBrk="1" latinLnBrk="0" hangingPunct="1">
@@ -5059,10 +5574,15 @@
             <a:spLocks noGrp="1"/>
           </p:cNvSpPr>
           <p:nvPr>
-            <p:ph type="subTitle" idx="1"/>
-          </p:nvPr>
-        </p:nvSpPr>
-        <p:spPr/>
+            <p:ph type="subTitle" idx="4294967295"/>
+          </p:nvPr>
+        </p:nvSpPr>
+        <p:spPr>
+          <a:xfrm>
+            <a:off x="914400" y="4318000"/>
+            <a:ext cx="8001000" cy="2540000"/>
+          </a:xfrm>
+        </p:spPr>
         <p:txBody>
           <a:bodyPr/>
           <a:lstStyle/>
@@ -5077,12 +5597,12 @@
       </p:sp>
       <p:sp>
         <p:nvSpPr>
-          <p:cNvPr id="2" name="Title 1"/>
-          <p:cNvSpPr>
-            <a:spLocks noGrp="1"/>
-          </p:cNvSpPr>
-          <p:nvPr>
-            <p:ph type="ctrTitle"/>
+          <p:cNvPr id="13" name="Title 12"/>
+          <p:cNvSpPr>
+            <a:spLocks noGrp="1"/>
+          </p:cNvSpPr>
+          <p:nvPr>
+            <p:ph type="title"/>
           </p:nvPr>
         </p:nvSpPr>
         <p:spPr/>
@@ -5090,10 +5610,6 @@
           <a:bodyPr/>
           <a:lstStyle/>
           <a:p>
-            <a:r>
-              <a:rPr lang="en-US" dirty="0" smtClean="0"/>
-              <a:t>SAGA</a:t>
-            </a:r>
             <a:endParaRPr lang="en-US" dirty="0"/>
           </a:p>
         </p:txBody>
@@ -5101,41 +5617,6 @@
       <p:pic>
         <p:nvPicPr>
           <p:cNvPr id="8" name="Picture 7"/>
-          <p:cNvPicPr>
-            <a:picLocks noChangeAspect="1"/>
-          </p:cNvPicPr>
-          <p:nvPr/>
-        </p:nvPicPr>
-        <p:blipFill>
-          <a:blip r:embed="rId2">
-            <a:clrChange>
-              <a:clrFrom>
-                <a:srgbClr val="FFFFFF"/>
-              </a:clrFrom>
-              <a:clrTo>
-                <a:srgbClr val="FFFFFF">
-                  <a:alpha val="0"/>
-                </a:srgbClr>
-              </a:clrTo>
-            </a:clrChange>
-          </a:blip>
-          <a:stretch>
-            <a:fillRect/>
-          </a:stretch>
-        </p:blipFill>
-        <p:spPr>
-          <a:xfrm>
-            <a:off x="7040494" y="6302526"/>
-            <a:ext cx="472733" cy="463656"/>
-          </a:xfrm>
-          <a:prstGeom prst="rect">
-            <a:avLst/>
-          </a:prstGeom>
-        </p:spPr>
-      </p:pic>
-      <p:pic>
-        <p:nvPicPr>
-          <p:cNvPr id="9" name="Picture 8"/>
           <p:cNvPicPr>
             <a:picLocks noChangeAspect="1"/>
           </p:cNvPicPr>
@@ -5160,7 +5641,42 @@
         </p:blipFill>
         <p:spPr>
           <a:xfrm>
-            <a:off x="6416597" y="6302526"/>
+            <a:off x="8205509" y="6282902"/>
+            <a:ext cx="472733" cy="463656"/>
+          </a:xfrm>
+          <a:prstGeom prst="rect">
+            <a:avLst/>
+          </a:prstGeom>
+        </p:spPr>
+      </p:pic>
+      <p:pic>
+        <p:nvPicPr>
+          <p:cNvPr id="9" name="Picture 8"/>
+          <p:cNvPicPr>
+            <a:picLocks noChangeAspect="1"/>
+          </p:cNvPicPr>
+          <p:nvPr/>
+        </p:nvPicPr>
+        <p:blipFill>
+          <a:blip r:embed="rId4">
+            <a:clrChange>
+              <a:clrFrom>
+                <a:srgbClr val="FFFFFF"/>
+              </a:clrFrom>
+              <a:clrTo>
+                <a:srgbClr val="FFFFFF">
+                  <a:alpha val="0"/>
+                </a:srgbClr>
+              </a:clrTo>
+            </a:clrChange>
+          </a:blip>
+          <a:stretch>
+            <a:fillRect/>
+          </a:stretch>
+        </p:blipFill>
+        <p:spPr>
+          <a:xfrm>
+            <a:off x="7641023" y="6271762"/>
             <a:ext cx="463656" cy="463656"/>
           </a:xfrm>
           <a:prstGeom prst="rect">
@@ -5177,14 +5693,14 @@
           <p:nvPr/>
         </p:nvPicPr>
         <p:blipFill>
-          <a:blip r:embed="rId4"/>
+          <a:blip r:embed="rId5"/>
           <a:stretch>
             <a:fillRect/>
           </a:stretch>
         </p:blipFill>
         <p:spPr>
           <a:xfrm>
-            <a:off x="7691483" y="6313666"/>
+            <a:off x="6488770" y="6306664"/>
             <a:ext cx="1079685" cy="421752"/>
           </a:xfrm>
           <a:prstGeom prst="rect">
@@ -5239,11 +5755,7 @@
           <a:bodyPr/>
           <a:lstStyle/>
           <a:p>
-            <a:r>
-              <a:rPr lang="en-US" dirty="0" smtClean="0"/>
-              <a:t>Releases</a:t>
-            </a:r>
-            <a:endParaRPr lang="en-US" dirty="0"/>
+            <a:endParaRPr lang="en-US"/>
           </a:p>
         </p:txBody>
       </p:sp>
@@ -5262,23 +5774,7 @@
           <a:bodyPr/>
           <a:lstStyle/>
           <a:p>
-            <a:r>
-              <a:rPr lang="en-US" dirty="0" smtClean="0"/>
-              <a:t>We currently provide source releases only – they’re available at </a:t>
-            </a:r>
-            <a:r>
-              <a:rPr lang="en-US" dirty="0" smtClean="0">
-                <a:hlinkClick r:id="rId2"/>
-              </a:rPr>
-              <a:t>http://saga.cct.lsu.edu/download/</a:t>
-            </a:r>
-            <a:endParaRPr lang="en-US" dirty="0" smtClean="0"/>
-          </a:p>
-          <a:p>
-            <a:r>
-              <a:rPr lang="en-US" dirty="0" smtClean="0"/>
-              <a:t>We’re following a 6/8-weekly release cycle.</a:t>
-            </a:r>
+            <a:endParaRPr lang="en-US" dirty="0"/>
           </a:p>
         </p:txBody>
       </p:sp>
@@ -5287,109 +5783,6 @@
   <p:clrMapOvr>
     <a:masterClrMapping/>
   </p:clrMapOvr>
-  <p:timing>
-    <p:tnLst>
-      <p:par>
-        <p:cTn id="1" dur="indefinite" restart="never" nodeType="tmRoot"/>
-      </p:par>
-    </p:tnLst>
-  </p:timing>
-</p:sld>
-</file>
-
-<file path=ppt/slides/slide3.xml><?xml version="1.0" encoding="utf-8"?>
-<p:sld xmlns:a="http://schemas.openxmlformats.org/drawingml/2006/main" xmlns:r="http://schemas.openxmlformats.org/officeDocument/2006/relationships" xmlns:mc="http://schemas.openxmlformats.org/markup-compatibility/2006" xmlns:mv="urn:schemas-microsoft-com:mac:vml" xmlns:p="http://schemas.openxmlformats.org/presentationml/2006/main" mc:Ignorable="mv" mc:PreserveAttributes="mv:*">
-  <p:cSld>
-    <p:spTree>
-      <p:nvGrpSpPr>
-        <p:cNvPr id="1" name=""/>
-        <p:cNvGrpSpPr/>
-        <p:nvPr/>
-      </p:nvGrpSpPr>
-      <p:grpSpPr>
-        <a:xfrm>
-          <a:off x="0" y="0"/>
-          <a:ext cx="0" cy="0"/>
-          <a:chOff x="0" y="0"/>
-          <a:chExt cx="0" cy="0"/>
-        </a:xfrm>
-      </p:grpSpPr>
-      <p:sp>
-        <p:nvSpPr>
-          <p:cNvPr id="2" name="Title 1"/>
-          <p:cNvSpPr>
-            <a:spLocks noGrp="1"/>
-          </p:cNvSpPr>
-          <p:nvPr>
-            <p:ph type="title"/>
-          </p:nvPr>
-        </p:nvSpPr>
-        <p:spPr/>
-        <p:txBody>
-          <a:bodyPr/>
-          <a:lstStyle/>
-          <a:p>
-            <a:r>
-              <a:rPr lang="en-US" dirty="0" smtClean="0"/>
-              <a:t>If Something Went Wrong</a:t>
-            </a:r>
-            <a:endParaRPr lang="en-US" dirty="0"/>
-          </a:p>
-        </p:txBody>
-      </p:sp>
-      <p:sp>
-        <p:nvSpPr>
-          <p:cNvPr id="3" name="Content Placeholder 2"/>
-          <p:cNvSpPr>
-            <a:spLocks noGrp="1"/>
-          </p:cNvSpPr>
-          <p:nvPr>
-            <p:ph idx="1"/>
-          </p:nvPr>
-        </p:nvSpPr>
-        <p:spPr/>
-        <p:txBody>
-          <a:bodyPr/>
-          <a:lstStyle/>
-          <a:p>
-            <a:r>
-              <a:rPr lang="en-US" dirty="0" smtClean="0"/>
-              <a:t>SAGA is not perfect. If you’ve discovered a bug or you desperately need a certain feature let us know!</a:t>
-            </a:r>
-          </a:p>
-          <a:p>
-            <a:r>
-              <a:rPr lang="en-US" dirty="0" smtClean="0"/>
-              <a:t>File a bug or feature request here: </a:t>
-            </a:r>
-            <a:r>
-              <a:rPr lang="en-US" dirty="0" smtClean="0">
-                <a:hlinkClick r:id="rId2"/>
-              </a:rPr>
-              <a:t>http://saga.cct.lsu.edu/development/bug-tracking</a:t>
-            </a:r>
-            <a:endParaRPr lang="en-US" dirty="0" smtClean="0"/>
-          </a:p>
-          <a:p>
-            <a:pPr>
-              <a:buNone/>
-            </a:pPr>
-            <a:endParaRPr lang="en-US" dirty="0"/>
-          </a:p>
-        </p:txBody>
-      </p:sp>
-    </p:spTree>
-  </p:cSld>
-  <p:clrMapOvr>
-    <a:masterClrMapping/>
-  </p:clrMapOvr>
-  <p:timing>
-    <p:tnLst>
-      <p:par>
-        <p:cTn id="1" dur="indefinite" restart="never" nodeType="tmRoot"/>
-      </p:par>
-    </p:tnLst>
-  </p:timing>
 </p:sld>
 </file>
 
@@ -5580,4 +5973,640 @@
   </a:objectDefaults>
   <a:extraClrSchemeLst/>
 </a:theme>
+</file>
+
+<file path=ppt/theme/theme2.xml><?xml version="1.0" encoding="utf-8"?>
+<a:theme xmlns:a="http://schemas.openxmlformats.org/drawingml/2006/main" name="Office Theme">
+  <a:themeElements>
+    <a:clrScheme name="Office">
+      <a:dk1>
+        <a:sysClr val="windowText" lastClr="000000"/>
+      </a:dk1>
+      <a:lt1>
+        <a:sysClr val="window" lastClr="FFFFFF"/>
+      </a:lt1>
+      <a:dk2>
+        <a:srgbClr val="1F497D"/>
+      </a:dk2>
+      <a:lt2>
+        <a:srgbClr val="EEECE1"/>
+      </a:lt2>
+      <a:accent1>
+        <a:srgbClr val="4F81BD"/>
+      </a:accent1>
+      <a:accent2>
+        <a:srgbClr val="C0504D"/>
+      </a:accent2>
+      <a:accent3>
+        <a:srgbClr val="9BBB59"/>
+      </a:accent3>
+      <a:accent4>
+        <a:srgbClr val="8064A2"/>
+      </a:accent4>
+      <a:accent5>
+        <a:srgbClr val="4BACC6"/>
+      </a:accent5>
+      <a:accent6>
+        <a:srgbClr val="F79646"/>
+      </a:accent6>
+      <a:hlink>
+        <a:srgbClr val="0000FF"/>
+      </a:hlink>
+      <a:folHlink>
+        <a:srgbClr val="800080"/>
+      </a:folHlink>
+    </a:clrScheme>
+    <a:fontScheme name="Office">
+      <a:majorFont>
+        <a:latin typeface="Calibri"/>
+        <a:ea typeface=""/>
+        <a:cs typeface=""/>
+        <a:font script="Jpan" typeface="ＭＳ Ｐゴシック"/>
+        <a:font script="Hang" typeface="맑은 고딕"/>
+        <a:font script="Hans" typeface="宋体"/>
+        <a:font script="Hant" typeface="新細明體"/>
+        <a:font script="Arab" typeface="Times New Roman"/>
+        <a:font script="Hebr" typeface="Times New Roman"/>
+        <a:font script="Thai" typeface="Angsana New"/>
+        <a:font script="Ethi" typeface="Nyala"/>
+        <a:font script="Beng" typeface="Vrinda"/>
+        <a:font script="Gujr" typeface="Shruti"/>
+        <a:font script="Khmr" typeface="MoolBoran"/>
+        <a:font script="Knda" typeface="Tunga"/>
+        <a:font script="Guru" typeface="Raavi"/>
+        <a:font script="Cans" typeface="Euphemia"/>
+        <a:font script="Cher" typeface="Plantagenet Cherokee"/>
+        <a:font script="Yiii" typeface="Microsoft Yi Baiti"/>
+        <a:font script="Tibt" typeface="Microsoft Himalaya"/>
+        <a:font script="Thaa" typeface="MV Boli"/>
+        <a:font script="Deva" typeface="Mangal"/>
+        <a:font script="Telu" typeface="Gautami"/>
+        <a:font script="Taml" typeface="Latha"/>
+        <a:font script="Syrc" typeface="Estrangelo Edessa"/>
+        <a:font script="Orya" typeface="Kalinga"/>
+        <a:font script="Mlym" typeface="Kartika"/>
+        <a:font script="Laoo" typeface="DokChampa"/>
+        <a:font script="Sinh" typeface="Iskoola Pota"/>
+        <a:font script="Mong" typeface="Mongolian Baiti"/>
+        <a:font script="Viet" typeface="Times New Roman"/>
+        <a:font script="Uigh" typeface="Microsoft Uighur"/>
+      </a:majorFont>
+      <a:minorFont>
+        <a:latin typeface="Calibri"/>
+        <a:ea typeface=""/>
+        <a:cs typeface=""/>
+        <a:font script="Jpan" typeface="ＭＳ Ｐゴシック"/>
+        <a:font script="Hang" typeface="맑은 고딕"/>
+        <a:font script="Hans" typeface="宋体"/>
+        <a:font script="Hant" typeface="新細明體"/>
+        <a:font script="Arab" typeface="Arial"/>
+        <a:font script="Hebr" typeface="Arial"/>
+        <a:font script="Thai" typeface="Cordia New"/>
+        <a:font script="Ethi" typeface="Nyala"/>
+        <a:font script="Beng" typeface="Vrinda"/>
+        <a:font script="Gujr" typeface="Shruti"/>
+        <a:font script="Khmr" typeface="DaunPenh"/>
+        <a:font script="Knda" typeface="Tunga"/>
+        <a:font script="Guru" typeface="Raavi"/>
+        <a:font script="Cans" typeface="Euphemia"/>
+        <a:font script="Cher" typeface="Plantagenet Cherokee"/>
+        <a:font script="Yiii" typeface="Microsoft Yi Baiti"/>
+        <a:font script="Tibt" typeface="Microsoft Himalaya"/>
+        <a:font script="Thaa" typeface="MV Boli"/>
+        <a:font script="Deva" typeface="Mangal"/>
+        <a:font script="Telu" typeface="Gautami"/>
+        <a:font script="Taml" typeface="Latha"/>
+        <a:font script="Syrc" typeface="Estrangelo Edessa"/>
+        <a:font script="Orya" typeface="Kalinga"/>
+        <a:font script="Mlym" typeface="Kartika"/>
+        <a:font script="Laoo" typeface="DokChampa"/>
+        <a:font script="Sinh" typeface="Iskoola Pota"/>
+        <a:font script="Mong" typeface="Mongolian Baiti"/>
+        <a:font script="Viet" typeface="Arial"/>
+        <a:font script="Uigh" typeface="Microsoft Uighur"/>
+      </a:minorFont>
+    </a:fontScheme>
+    <a:fmtScheme name="Office">
+      <a:fillStyleLst>
+        <a:solidFill>
+          <a:schemeClr val="phClr"/>
+        </a:solidFill>
+        <a:gradFill rotWithShape="1">
+          <a:gsLst>
+            <a:gs pos="0">
+              <a:schemeClr val="phClr">
+                <a:tint val="50000"/>
+                <a:satMod val="300000"/>
+              </a:schemeClr>
+            </a:gs>
+            <a:gs pos="35000">
+              <a:schemeClr val="phClr">
+                <a:tint val="37000"/>
+                <a:satMod val="300000"/>
+              </a:schemeClr>
+            </a:gs>
+            <a:gs pos="100000">
+              <a:schemeClr val="phClr">
+                <a:tint val="15000"/>
+                <a:satMod val="350000"/>
+              </a:schemeClr>
+            </a:gs>
+          </a:gsLst>
+          <a:lin ang="16200000" scaled="1"/>
+        </a:gradFill>
+        <a:gradFill rotWithShape="1">
+          <a:gsLst>
+            <a:gs pos="0">
+              <a:schemeClr val="phClr">
+                <a:tint val="100000"/>
+                <a:shade val="100000"/>
+                <a:satMod val="130000"/>
+              </a:schemeClr>
+            </a:gs>
+            <a:gs pos="100000">
+              <a:schemeClr val="phClr">
+                <a:tint val="50000"/>
+                <a:shade val="100000"/>
+                <a:satMod val="350000"/>
+              </a:schemeClr>
+            </a:gs>
+          </a:gsLst>
+          <a:lin ang="16200000" scaled="0"/>
+        </a:gradFill>
+      </a:fillStyleLst>
+      <a:lnStyleLst>
+        <a:ln w="9525" cap="flat" cmpd="sng" algn="ctr">
+          <a:solidFill>
+            <a:schemeClr val="phClr">
+              <a:shade val="95000"/>
+              <a:satMod val="105000"/>
+            </a:schemeClr>
+          </a:solidFill>
+          <a:prstDash val="solid"/>
+        </a:ln>
+        <a:ln w="25400" cap="flat" cmpd="sng" algn="ctr">
+          <a:solidFill>
+            <a:schemeClr val="phClr"/>
+          </a:solidFill>
+          <a:prstDash val="solid"/>
+        </a:ln>
+        <a:ln w="38100" cap="flat" cmpd="sng" algn="ctr">
+          <a:solidFill>
+            <a:schemeClr val="phClr"/>
+          </a:solidFill>
+          <a:prstDash val="solid"/>
+        </a:ln>
+      </a:lnStyleLst>
+      <a:effectStyleLst>
+        <a:effectStyle>
+          <a:effectLst>
+            <a:outerShdw blurRad="40000" dist="20000" dir="5400000" rotWithShape="0">
+              <a:srgbClr val="000000">
+                <a:alpha val="38000"/>
+              </a:srgbClr>
+            </a:outerShdw>
+          </a:effectLst>
+        </a:effectStyle>
+        <a:effectStyle>
+          <a:effectLst>
+            <a:outerShdw blurRad="40000" dist="23000" dir="5400000" rotWithShape="0">
+              <a:srgbClr val="000000">
+                <a:alpha val="35000"/>
+              </a:srgbClr>
+            </a:outerShdw>
+          </a:effectLst>
+        </a:effectStyle>
+        <a:effectStyle>
+          <a:effectLst>
+            <a:outerShdw blurRad="40000" dist="23000" dir="5400000" rotWithShape="0">
+              <a:srgbClr val="000000">
+                <a:alpha val="35000"/>
+              </a:srgbClr>
+            </a:outerShdw>
+          </a:effectLst>
+          <a:scene3d>
+            <a:camera prst="orthographicFront">
+              <a:rot lat="0" lon="0" rev="0"/>
+            </a:camera>
+            <a:lightRig rig="threePt" dir="t">
+              <a:rot lat="0" lon="0" rev="1200000"/>
+            </a:lightRig>
+          </a:scene3d>
+          <a:sp3d>
+            <a:bevelT w="63500" h="25400"/>
+          </a:sp3d>
+        </a:effectStyle>
+      </a:effectStyleLst>
+      <a:bgFillStyleLst>
+        <a:solidFill>
+          <a:schemeClr val="phClr"/>
+        </a:solidFill>
+        <a:gradFill rotWithShape="1">
+          <a:gsLst>
+            <a:gs pos="0">
+              <a:schemeClr val="phClr">
+                <a:tint val="40000"/>
+                <a:satMod val="350000"/>
+              </a:schemeClr>
+            </a:gs>
+            <a:gs pos="40000">
+              <a:schemeClr val="phClr">
+                <a:tint val="45000"/>
+                <a:shade val="99000"/>
+                <a:satMod val="350000"/>
+              </a:schemeClr>
+            </a:gs>
+            <a:gs pos="100000">
+              <a:schemeClr val="phClr">
+                <a:shade val="20000"/>
+                <a:satMod val="255000"/>
+              </a:schemeClr>
+            </a:gs>
+          </a:gsLst>
+          <a:path path="circle">
+            <a:fillToRect l="50000" t="-80000" r="50000" b="180000"/>
+          </a:path>
+        </a:gradFill>
+        <a:gradFill rotWithShape="1">
+          <a:gsLst>
+            <a:gs pos="0">
+              <a:schemeClr val="phClr">
+                <a:tint val="80000"/>
+                <a:satMod val="300000"/>
+              </a:schemeClr>
+            </a:gs>
+            <a:gs pos="100000">
+              <a:schemeClr val="phClr">
+                <a:shade val="30000"/>
+                <a:satMod val="200000"/>
+              </a:schemeClr>
+            </a:gs>
+          </a:gsLst>
+          <a:path path="circle">
+            <a:fillToRect l="50000" t="50000" r="50000" b="50000"/>
+          </a:path>
+        </a:gradFill>
+      </a:bgFillStyleLst>
+    </a:fmtScheme>
+  </a:themeElements>
+  <a:objectDefaults>
+    <a:spDef>
+      <a:spPr/>
+      <a:bodyPr/>
+      <a:lstStyle/>
+      <a:style>
+        <a:lnRef idx="1">
+          <a:schemeClr val="accent1"/>
+        </a:lnRef>
+        <a:fillRef idx="3">
+          <a:schemeClr val="accent1"/>
+        </a:fillRef>
+        <a:effectRef idx="2">
+          <a:schemeClr val="accent1"/>
+        </a:effectRef>
+        <a:fontRef idx="minor">
+          <a:schemeClr val="lt1"/>
+        </a:fontRef>
+      </a:style>
+    </a:spDef>
+    <a:lnDef>
+      <a:spPr/>
+      <a:bodyPr/>
+      <a:lstStyle/>
+      <a:style>
+        <a:lnRef idx="2">
+          <a:schemeClr val="accent1"/>
+        </a:lnRef>
+        <a:fillRef idx="0">
+          <a:schemeClr val="accent1"/>
+        </a:fillRef>
+        <a:effectRef idx="1">
+          <a:schemeClr val="accent1"/>
+        </a:effectRef>
+        <a:fontRef idx="minor">
+          <a:schemeClr val="tx1"/>
+        </a:fontRef>
+      </a:style>
+    </a:lnDef>
+  </a:objectDefaults>
+  <a:extraClrSchemeLst/>
+</a:theme>
+</file>
+
+<file path=ppt/theme/theme3.xml><?xml version="1.0" encoding="utf-8"?>
+<a:theme xmlns:a="http://schemas.openxmlformats.org/drawingml/2006/main" name="Office Theme">
+  <a:themeElements>
+    <a:clrScheme name="Office">
+      <a:dk1>
+        <a:sysClr val="windowText" lastClr="000000"/>
+      </a:dk1>
+      <a:lt1>
+        <a:sysClr val="window" lastClr="FFFFFF"/>
+      </a:lt1>
+      <a:dk2>
+        <a:srgbClr val="1F497D"/>
+      </a:dk2>
+      <a:lt2>
+        <a:srgbClr val="EEECE1"/>
+      </a:lt2>
+      <a:accent1>
+        <a:srgbClr val="4F81BD"/>
+      </a:accent1>
+      <a:accent2>
+        <a:srgbClr val="C0504D"/>
+      </a:accent2>
+      <a:accent3>
+        <a:srgbClr val="9BBB59"/>
+      </a:accent3>
+      <a:accent4>
+        <a:srgbClr val="8064A2"/>
+      </a:accent4>
+      <a:accent5>
+        <a:srgbClr val="4BACC6"/>
+      </a:accent5>
+      <a:accent6>
+        <a:srgbClr val="F79646"/>
+      </a:accent6>
+      <a:hlink>
+        <a:srgbClr val="0000FF"/>
+      </a:hlink>
+      <a:folHlink>
+        <a:srgbClr val="800080"/>
+      </a:folHlink>
+    </a:clrScheme>
+    <a:fontScheme name="Office">
+      <a:majorFont>
+        <a:latin typeface="Calibri"/>
+        <a:ea typeface=""/>
+        <a:cs typeface=""/>
+        <a:font script="Jpan" typeface="ＭＳ Ｐゴシック"/>
+        <a:font script="Hang" typeface="맑은 고딕"/>
+        <a:font script="Hans" typeface="宋体"/>
+        <a:font script="Hant" typeface="新細明體"/>
+        <a:font script="Arab" typeface="Times New Roman"/>
+        <a:font script="Hebr" typeface="Times New Roman"/>
+        <a:font script="Thai" typeface="Angsana New"/>
+        <a:font script="Ethi" typeface="Nyala"/>
+        <a:font script="Beng" typeface="Vrinda"/>
+        <a:font script="Gujr" typeface="Shruti"/>
+        <a:font script="Khmr" typeface="MoolBoran"/>
+        <a:font script="Knda" typeface="Tunga"/>
+        <a:font script="Guru" typeface="Raavi"/>
+        <a:font script="Cans" typeface="Euphemia"/>
+        <a:font script="Cher" typeface="Plantagenet Cherokee"/>
+        <a:font script="Yiii" typeface="Microsoft Yi Baiti"/>
+        <a:font script="Tibt" typeface="Microsoft Himalaya"/>
+        <a:font script="Thaa" typeface="MV Boli"/>
+        <a:font script="Deva" typeface="Mangal"/>
+        <a:font script="Telu" typeface="Gautami"/>
+        <a:font script="Taml" typeface="Latha"/>
+        <a:font script="Syrc" typeface="Estrangelo Edessa"/>
+        <a:font script="Orya" typeface="Kalinga"/>
+        <a:font script="Mlym" typeface="Kartika"/>
+        <a:font script="Laoo" typeface="DokChampa"/>
+        <a:font script="Sinh" typeface="Iskoola Pota"/>
+        <a:font script="Mong" typeface="Mongolian Baiti"/>
+        <a:font script="Viet" typeface="Times New Roman"/>
+        <a:font script="Uigh" typeface="Microsoft Uighur"/>
+      </a:majorFont>
+      <a:minorFont>
+        <a:latin typeface="Calibri"/>
+        <a:ea typeface=""/>
+        <a:cs typeface=""/>
+        <a:font script="Jpan" typeface="ＭＳ Ｐゴシック"/>
+        <a:font script="Hang" typeface="맑은 고딕"/>
+        <a:font script="Hans" typeface="宋体"/>
+        <a:font script="Hant" typeface="新細明體"/>
+        <a:font script="Arab" typeface="Arial"/>
+        <a:font script="Hebr" typeface="Arial"/>
+        <a:font script="Thai" typeface="Cordia New"/>
+        <a:font script="Ethi" typeface="Nyala"/>
+        <a:font script="Beng" typeface="Vrinda"/>
+        <a:font script="Gujr" typeface="Shruti"/>
+        <a:font script="Khmr" typeface="DaunPenh"/>
+        <a:font script="Knda" typeface="Tunga"/>
+        <a:font script="Guru" typeface="Raavi"/>
+        <a:font script="Cans" typeface="Euphemia"/>
+        <a:font script="Cher" typeface="Plantagenet Cherokee"/>
+        <a:font script="Yiii" typeface="Microsoft Yi Baiti"/>
+        <a:font script="Tibt" typeface="Microsoft Himalaya"/>
+        <a:font script="Thaa" typeface="MV Boli"/>
+        <a:font script="Deva" typeface="Mangal"/>
+        <a:font script="Telu" typeface="Gautami"/>
+        <a:font script="Taml" typeface="Latha"/>
+        <a:font script="Syrc" typeface="Estrangelo Edessa"/>
+        <a:font script="Orya" typeface="Kalinga"/>
+        <a:font script="Mlym" typeface="Kartika"/>
+        <a:font script="Laoo" typeface="DokChampa"/>
+        <a:font script="Sinh" typeface="Iskoola Pota"/>
+        <a:font script="Mong" typeface="Mongolian Baiti"/>
+        <a:font script="Viet" typeface="Arial"/>
+        <a:font script="Uigh" typeface="Microsoft Uighur"/>
+      </a:minorFont>
+    </a:fontScheme>
+    <a:fmtScheme name="Office">
+      <a:fillStyleLst>
+        <a:solidFill>
+          <a:schemeClr val="phClr"/>
+        </a:solidFill>
+        <a:gradFill rotWithShape="1">
+          <a:gsLst>
+            <a:gs pos="0">
+              <a:schemeClr val="phClr">
+                <a:tint val="50000"/>
+                <a:satMod val="300000"/>
+              </a:schemeClr>
+            </a:gs>
+            <a:gs pos="35000">
+              <a:schemeClr val="phClr">
+                <a:tint val="37000"/>
+                <a:satMod val="300000"/>
+              </a:schemeClr>
+            </a:gs>
+            <a:gs pos="100000">
+              <a:schemeClr val="phClr">
+                <a:tint val="15000"/>
+                <a:satMod val="350000"/>
+              </a:schemeClr>
+            </a:gs>
+          </a:gsLst>
+          <a:lin ang="16200000" scaled="1"/>
+        </a:gradFill>
+        <a:gradFill rotWithShape="1">
+          <a:gsLst>
+            <a:gs pos="0">
+              <a:schemeClr val="phClr">
+                <a:tint val="100000"/>
+                <a:shade val="100000"/>
+                <a:satMod val="130000"/>
+              </a:schemeClr>
+            </a:gs>
+            <a:gs pos="100000">
+              <a:schemeClr val="phClr">
+                <a:tint val="50000"/>
+                <a:shade val="100000"/>
+                <a:satMod val="350000"/>
+              </a:schemeClr>
+            </a:gs>
+          </a:gsLst>
+          <a:lin ang="16200000" scaled="0"/>
+        </a:gradFill>
+      </a:fillStyleLst>
+      <a:lnStyleLst>
+        <a:ln w="9525" cap="flat" cmpd="sng" algn="ctr">
+          <a:solidFill>
+            <a:schemeClr val="phClr">
+              <a:shade val="95000"/>
+              <a:satMod val="105000"/>
+            </a:schemeClr>
+          </a:solidFill>
+          <a:prstDash val="solid"/>
+        </a:ln>
+        <a:ln w="25400" cap="flat" cmpd="sng" algn="ctr">
+          <a:solidFill>
+            <a:schemeClr val="phClr"/>
+          </a:solidFill>
+          <a:prstDash val="solid"/>
+        </a:ln>
+        <a:ln w="38100" cap="flat" cmpd="sng" algn="ctr">
+          <a:solidFill>
+            <a:schemeClr val="phClr"/>
+          </a:solidFill>
+          <a:prstDash val="solid"/>
+        </a:ln>
+      </a:lnStyleLst>
+      <a:effectStyleLst>
+        <a:effectStyle>
+          <a:effectLst>
+            <a:outerShdw blurRad="40000" dist="20000" dir="5400000" rotWithShape="0">
+              <a:srgbClr val="000000">
+                <a:alpha val="38000"/>
+              </a:srgbClr>
+            </a:outerShdw>
+          </a:effectLst>
+        </a:effectStyle>
+        <a:effectStyle>
+          <a:effectLst>
+            <a:outerShdw blurRad="40000" dist="23000" dir="5400000" rotWithShape="0">
+              <a:srgbClr val="000000">
+                <a:alpha val="35000"/>
+              </a:srgbClr>
+            </a:outerShdw>
+          </a:effectLst>
+        </a:effectStyle>
+        <a:effectStyle>
+          <a:effectLst>
+            <a:outerShdw blurRad="40000" dist="23000" dir="5400000" rotWithShape="0">
+              <a:srgbClr val="000000">
+                <a:alpha val="35000"/>
+              </a:srgbClr>
+            </a:outerShdw>
+          </a:effectLst>
+          <a:scene3d>
+            <a:camera prst="orthographicFront">
+              <a:rot lat="0" lon="0" rev="0"/>
+            </a:camera>
+            <a:lightRig rig="threePt" dir="t">
+              <a:rot lat="0" lon="0" rev="1200000"/>
+            </a:lightRig>
+          </a:scene3d>
+          <a:sp3d>
+            <a:bevelT w="63500" h="25400"/>
+          </a:sp3d>
+        </a:effectStyle>
+      </a:effectStyleLst>
+      <a:bgFillStyleLst>
+        <a:solidFill>
+          <a:schemeClr val="phClr"/>
+        </a:solidFill>
+        <a:gradFill rotWithShape="1">
+          <a:gsLst>
+            <a:gs pos="0">
+              <a:schemeClr val="phClr">
+                <a:tint val="40000"/>
+                <a:satMod val="350000"/>
+              </a:schemeClr>
+            </a:gs>
+            <a:gs pos="40000">
+              <a:schemeClr val="phClr">
+                <a:tint val="45000"/>
+                <a:shade val="99000"/>
+                <a:satMod val="350000"/>
+              </a:schemeClr>
+            </a:gs>
+            <a:gs pos="100000">
+              <a:schemeClr val="phClr">
+                <a:shade val="20000"/>
+                <a:satMod val="255000"/>
+              </a:schemeClr>
+            </a:gs>
+          </a:gsLst>
+          <a:path path="circle">
+            <a:fillToRect l="50000" t="-80000" r="50000" b="180000"/>
+          </a:path>
+        </a:gradFill>
+        <a:gradFill rotWithShape="1">
+          <a:gsLst>
+            <a:gs pos="0">
+              <a:schemeClr val="phClr">
+                <a:tint val="80000"/>
+                <a:satMod val="300000"/>
+              </a:schemeClr>
+            </a:gs>
+            <a:gs pos="100000">
+              <a:schemeClr val="phClr">
+                <a:shade val="30000"/>
+                <a:satMod val="200000"/>
+              </a:schemeClr>
+            </a:gs>
+          </a:gsLst>
+          <a:path path="circle">
+            <a:fillToRect l="50000" t="50000" r="50000" b="50000"/>
+          </a:path>
+        </a:gradFill>
+      </a:bgFillStyleLst>
+    </a:fmtScheme>
+  </a:themeElements>
+  <a:objectDefaults>
+    <a:spDef>
+      <a:spPr/>
+      <a:bodyPr/>
+      <a:lstStyle/>
+      <a:style>
+        <a:lnRef idx="1">
+          <a:schemeClr val="accent1"/>
+        </a:lnRef>
+        <a:fillRef idx="3">
+          <a:schemeClr val="accent1"/>
+        </a:fillRef>
+        <a:effectRef idx="2">
+          <a:schemeClr val="accent1"/>
+        </a:effectRef>
+        <a:fontRef idx="minor">
+          <a:schemeClr val="lt1"/>
+        </a:fontRef>
+      </a:style>
+    </a:spDef>
+    <a:lnDef>
+      <a:spPr/>
+      <a:bodyPr/>
+      <a:lstStyle/>
+      <a:style>
+        <a:lnRef idx="2">
+          <a:schemeClr val="accent1"/>
+        </a:lnRef>
+        <a:fillRef idx="0">
+          <a:schemeClr val="accent1"/>
+        </a:fillRef>
+        <a:effectRef idx="1">
+          <a:schemeClr val="accent1"/>
+        </a:effectRef>
+        <a:fontRef idx="minor">
+          <a:schemeClr val="tx1"/>
+        </a:fontRef>
+      </a:style>
+    </a:lnDef>
+  </a:objectDefaults>
+  <a:extraClrSchemeLst/>
+</a:theme>
 </file>
</xml_diff>

<commit_message>
Added template for code box.
git-svn-id: file://localhost/tmp/svn2git/svn@2918 defb5e50-622e-49ec-a68e-d72c7db87b45
</commit_message>
<xml_diff>
--- a/misc/SAGA Slide Template.pptx
+++ b/misc/SAGA Slide Template.pptx
@@ -5,14 +5,15 @@
     <p:sldMasterId id="2147483660" r:id="rId1"/>
   </p:sldMasterIdLst>
   <p:notesMasterIdLst>
-    <p:notesMasterId r:id="rId4"/>
+    <p:notesMasterId r:id="rId5"/>
   </p:notesMasterIdLst>
   <p:handoutMasterIdLst>
-    <p:handoutMasterId r:id="rId5"/>
+    <p:handoutMasterId r:id="rId6"/>
   </p:handoutMasterIdLst>
   <p:sldIdLst>
     <p:sldId id="256" r:id="rId2"/>
-    <p:sldId id="257" r:id="rId3"/>
+    <p:sldId id="258" r:id="rId3"/>
+    <p:sldId id="259" r:id="rId4"/>
   </p:sldIdLst>
   <p:sldSz cx="9144000" cy="6858000" type="screen4x3"/>
   <p:notesSz cx="6858000" cy="9144000"/>
@@ -197,7 +198,7 @@
             <a:fld id="{9A6AC4B2-6F12-454D-8DA7-7B9C78843B81}" type="datetimeFigureOut">
               <a:rPr lang="en-US" smtClean="0"/>
               <a:pPr/>
-              <a:t>2/9/10</a:t>
+              <a:t>8/25/10</a:t>
             </a:fld>
             <a:endParaRPr lang="en-US"/>
           </a:p>
@@ -360,7 +361,7 @@
             <a:fld id="{19F24AD4-A78B-B645-8B43-825B1EB2901C}" type="datetimeFigureOut">
               <a:rPr lang="en-US" smtClean="0"/>
               <a:pPr/>
-              <a:t>2/9/10</a:t>
+              <a:t>8/25/10</a:t>
             </a:fld>
             <a:endParaRPr lang="en-US"/>
           </a:p>
@@ -896,7 +897,7 @@
             <a:fld id="{ADB8239A-D789-5443-937F-338E3AE3D41C}" type="datetime1">
               <a:rPr lang="en-US" smtClean="0"/>
               <a:pPr/>
-              <a:t>2/9/10</a:t>
+              <a:t>8/25/10</a:t>
             </a:fld>
             <a:endParaRPr lang="en-US"/>
           </a:p>
@@ -1200,7 +1201,7 @@
             <a:fld id="{459EC1CE-E98D-704D-AD6F-6E3323A36483}" type="datetime1">
               <a:rPr lang="en-US" smtClean="0"/>
               <a:pPr/>
-              <a:t>2/9/10</a:t>
+              <a:t>8/25/10</a:t>
             </a:fld>
             <a:endParaRPr lang="en-US"/>
           </a:p>
@@ -1476,7 +1477,7 @@
             <a:fld id="{23E692A5-8B3E-1949-B0CC-6F0593ACFA8E}" type="datetime1">
               <a:rPr lang="en-US" smtClean="0"/>
               <a:pPr/>
-              <a:t>2/9/10</a:t>
+              <a:t>8/25/10</a:t>
             </a:fld>
             <a:endParaRPr lang="en-US"/>
           </a:p>
@@ -1768,7 +1769,7 @@
             <a:fld id="{C381DA14-A3C0-9C42-96F2-BEE3D5DE963D}" type="datetime1">
               <a:rPr lang="en-US" smtClean="0"/>
               <a:pPr/>
-              <a:t>2/9/10</a:t>
+              <a:t>8/25/10</a:t>
             </a:fld>
             <a:endParaRPr lang="en-US"/>
           </a:p>
@@ -2095,7 +2096,7 @@
             <a:fld id="{33319320-9A5F-694B-B7B5-C734EC93AAA2}" type="datetime1">
               <a:rPr lang="en-US" smtClean="0"/>
               <a:pPr/>
-              <a:t>2/9/10</a:t>
+              <a:t>8/25/10</a:t>
             </a:fld>
             <a:endParaRPr lang="en-US"/>
           </a:p>
@@ -2343,7 +2344,7 @@
             <a:fld id="{CF6CE397-A6E6-7547-B24A-92BB5049E0F2}" type="datetime1">
               <a:rPr lang="en-US" smtClean="0"/>
               <a:pPr/>
-              <a:t>2/9/10</a:t>
+              <a:t>8/25/10</a:t>
             </a:fld>
             <a:endParaRPr lang="en-US"/>
           </a:p>
@@ -2520,7 +2521,7 @@
             <a:fld id="{27AB7D46-BD5E-E641-9118-DCE28F3B83FA}" type="datetime1">
               <a:rPr lang="en-US" smtClean="0"/>
               <a:pPr/>
-              <a:t>2/9/10</a:t>
+              <a:t>8/25/10</a:t>
             </a:fld>
             <a:endParaRPr lang="en-US"/>
           </a:p>
@@ -2772,7 +2773,7 @@
             <a:fld id="{BC26097E-015C-3B4D-86C1-CD2AD30F0B81}" type="datetime1">
               <a:rPr lang="en-US" smtClean="0"/>
               <a:pPr/>
-              <a:t>2/9/10</a:t>
+              <a:t>8/25/10</a:t>
             </a:fld>
             <a:endParaRPr lang="en-US"/>
           </a:p>
@@ -3048,7 +3049,7 @@
             <a:fld id="{ED6649F4-2545-3040-B7BD-803CA59D50C7}" type="datetime1">
               <a:rPr lang="en-US" smtClean="0"/>
               <a:pPr/>
-              <a:t>2/9/10</a:t>
+              <a:t>8/25/10</a:t>
             </a:fld>
             <a:endParaRPr lang="en-US"/>
           </a:p>
@@ -3356,7 +3357,7 @@
             <a:fld id="{833A9088-CEDD-2F48-A9A0-611A3CC03FE9}" type="datetime1">
               <a:rPr lang="en-US" smtClean="0"/>
               <a:pPr/>
-              <a:t>2/9/10</a:t>
+              <a:t>8/25/10</a:t>
             </a:fld>
             <a:endParaRPr lang="en-US"/>
           </a:p>
@@ -3650,7 +3651,7 @@
             <a:fld id="{AED87ACF-EB3C-EA42-8610-542FB50388EB}" type="datetime1">
               <a:rPr lang="en-US" smtClean="0"/>
               <a:pPr/>
-              <a:t>2/9/10</a:t>
+              <a:t>8/25/10</a:t>
             </a:fld>
             <a:endParaRPr lang="en-US"/>
           </a:p>
@@ -4082,7 +4083,7 @@
             <a:fld id="{0E0DC31B-692F-774E-A937-DA560DE61DA8}" type="datetime1">
               <a:rPr lang="en-US" smtClean="0"/>
               <a:pPr/>
-              <a:t>2/9/10</a:t>
+              <a:t>8/25/10</a:t>
             </a:fld>
             <a:endParaRPr lang="en-US"/>
           </a:p>
@@ -4430,7 +4431,7 @@
             <a:fld id="{95DEFDAE-5BDC-1B4F-BC4C-23C867CEBC21}" type="datetime1">
               <a:rPr lang="en-US" smtClean="0"/>
               <a:pPr/>
-              <a:t>2/9/10</a:t>
+              <a:t>8/25/10</a:t>
             </a:fld>
             <a:endParaRPr lang="en-US"/>
           </a:p>
@@ -4522,7 +4523,7 @@
             <a:fld id="{9F53C516-787B-9A45-AFCF-5D75DD78DEBE}" type="datetime1">
               <a:rPr lang="en-US" smtClean="0"/>
               <a:pPr/>
-              <a:t>2/9/10</a:t>
+              <a:t>8/25/10</a:t>
             </a:fld>
             <a:endParaRPr lang="en-US"/>
           </a:p>
@@ -4861,7 +4862,7 @@
             <a:fld id="{F19CAA94-9393-BB4A-8CB6-008B1351A132}" type="datetime1">
               <a:rPr lang="en-US" smtClean="0"/>
               <a:pPr/>
-              <a:t>2/9/10</a:t>
+              <a:t>8/25/10</a:t>
             </a:fld>
             <a:endParaRPr lang="en-US"/>
           </a:p>
@@ -5075,7 +5076,7 @@
             <a:fld id="{A3476A5E-2ED6-7749-A8C1-D0B1EEEB97E0}" type="datetime1">
               <a:rPr lang="en-US" smtClean="0"/>
               <a:pPr/>
-              <a:t>2/9/10</a:t>
+              <a:t>8/25/10</a:t>
             </a:fld>
             <a:endParaRPr lang="en-US"/>
           </a:p>
@@ -5779,6 +5780,116 @@
       </p:sp>
       <p:sp>
         <p:nvSpPr>
+          <p:cNvPr id="4" name="TextBox 3"/>
+          <p:cNvSpPr txBox="1"/>
+          <p:nvPr/>
+        </p:nvSpPr>
+        <p:spPr>
+          <a:xfrm>
+            <a:off x="757947" y="2571586"/>
+            <a:ext cx="7966954" cy="523220"/>
+          </a:xfrm>
+          <a:prstGeom prst="rect">
+            <a:avLst/>
+          </a:prstGeom>
+          <a:solidFill>
+            <a:srgbClr val="D7D9CD"/>
+          </a:solidFill>
+          <a:ln>
+            <a:solidFill>
+              <a:srgbClr val="8BADBD"/>
+            </a:solidFill>
+          </a:ln>
+        </p:spPr>
+        <p:style>
+          <a:lnRef idx="2">
+            <a:schemeClr val="accent4"/>
+          </a:lnRef>
+          <a:fillRef idx="1">
+            <a:schemeClr val="lt1"/>
+          </a:fillRef>
+          <a:effectRef idx="0">
+            <a:schemeClr val="accent4"/>
+          </a:effectRef>
+          <a:fontRef idx="minor">
+            <a:schemeClr val="dk1"/>
+          </a:fontRef>
+        </p:style>
+        <p:txBody>
+          <a:bodyPr wrap="square" rtlCol="0">
+            <a:spAutoFit/>
+          </a:bodyPr>
+          <a:lstStyle/>
+          <a:p>
+            <a:r>
+              <a:rPr lang="en-US" sz="1400" dirty="0" smtClean="0">
+                <a:latin typeface="Andale Mono"/>
+                <a:cs typeface="Andale Mono"/>
+              </a:rPr>
+              <a:t>10 PRINT “HELLO WORLD”</a:t>
+            </a:r>
+          </a:p>
+          <a:p>
+            <a:r>
+              <a:rPr lang="en-US" sz="1400" dirty="0" smtClean="0">
+                <a:latin typeface="Andale Mono"/>
+                <a:cs typeface="Andale Mono"/>
+              </a:rPr>
+              <a:t>20 GOTO 10</a:t>
+            </a:r>
+            <a:endParaRPr lang="en-US" sz="1400" dirty="0">
+              <a:latin typeface="Andale Mono"/>
+              <a:cs typeface="Andale Mono"/>
+            </a:endParaRPr>
+          </a:p>
+        </p:txBody>
+      </p:sp>
+    </p:spTree>
+  </p:cSld>
+  <p:clrMapOvr>
+    <a:masterClrMapping/>
+  </p:clrMapOvr>
+</p:sld>
+</file>
+
+<file path=ppt/slides/slide3.xml><?xml version="1.0" encoding="utf-8"?>
+<p:sld xmlns:a="http://schemas.openxmlformats.org/drawingml/2006/main" xmlns:r="http://schemas.openxmlformats.org/officeDocument/2006/relationships" xmlns:mc="http://schemas.openxmlformats.org/markup-compatibility/2006" xmlns:mv="urn:schemas-microsoft-com:mac:vml" xmlns:p="http://schemas.openxmlformats.org/presentationml/2006/main" mc:Ignorable="mv" mc:PreserveAttributes="mv:*">
+  <p:cSld>
+    <p:spTree>
+      <p:nvGrpSpPr>
+        <p:cNvPr id="1" name=""/>
+        <p:cNvGrpSpPr/>
+        <p:nvPr/>
+      </p:nvGrpSpPr>
+      <p:grpSpPr>
+        <a:xfrm>
+          <a:off x="0" y="0"/>
+          <a:ext cx="0" cy="0"/>
+          <a:chOff x="0" y="0"/>
+          <a:chExt cx="0" cy="0"/>
+        </a:xfrm>
+      </p:grpSpPr>
+      <p:sp>
+        <p:nvSpPr>
+          <p:cNvPr id="2" name="Title 1"/>
+          <p:cNvSpPr>
+            <a:spLocks noGrp="1"/>
+          </p:cNvSpPr>
+          <p:nvPr>
+            <p:ph type="title"/>
+          </p:nvPr>
+        </p:nvSpPr>
+        <p:spPr/>
+        <p:txBody>
+          <a:bodyPr/>
+          <a:lstStyle/>
+          <a:p>
+            <a:endParaRPr lang="en-US"/>
+          </a:p>
+        </p:txBody>
+      </p:sp>
+      <p:sp>
+        <p:nvSpPr>
           <p:cNvPr id="3" name="Content Placeholder 2"/>
           <p:cNvSpPr>
             <a:spLocks noGrp="1"/>
@@ -5787,12 +5898,7 @@
             <p:ph idx="1"/>
           </p:nvPr>
         </p:nvSpPr>
-        <p:spPr>
-          <a:xfrm>
-            <a:off x="1107129" y="2068618"/>
-            <a:ext cx="7617771" cy="4197711"/>
-          </a:xfrm>
-        </p:spPr>
+        <p:spPr/>
         <p:txBody>
           <a:bodyPr/>
           <a:lstStyle/>

</xml_diff>